<commit_message>
agrego lo que tengo que decir sobre la separacion de bultos.
</commit_message>
<xml_diff>
--- a/TodoMundo/Presentación/Presentacion.pptx
+++ b/TodoMundo/Presentación/Presentacion.pptx
@@ -1652,7 +1652,7 @@
       </dgm:t>
     </dgm:pt>
     <dgm:pt modelId="{08607BFF-5977-4D1F-B72D-D7C704DD49CC}" type="pres">
-      <dgm:prSet presAssocID="{6099C24C-12A6-43F9-A726-E53080D841CF}" presName="base" presStyleLbl="dkBgShp" presStyleIdx="1" presStyleCnt="2"/>
+      <dgm:prSet presAssocID="{6099C24C-12A6-43F9-A726-E53080D841CF}" presName="base" presStyleLbl="dkBgShp" presStyleIdx="1" presStyleCnt="2" custLinFactNeighborX="-313" custLinFactNeighborY="1794"/>
       <dgm:spPr/>
     </dgm:pt>
   </dgm:ptLst>
@@ -1684,9 +1684,9 @@
     <dgm:cxn modelId="{8D90936B-588F-4878-9F09-443FA0AB48CC}" type="presOf" srcId="{794F3E27-C02F-43EB-BB87-3BB32B972093}" destId="{F9B45773-AEDC-4709-9FD2-ED5D18B7C2C6}" srcOrd="0" destOrd="0" presId="urn:microsoft.com/office/officeart/2005/8/layout/hList3"/>
     <dgm:cxn modelId="{8AD3841A-638D-4937-84F0-2C83464B4C80}" type="presOf" srcId="{9FEDEA84-1978-4510-BEC2-46429310148C}" destId="{555023A0-0C75-4234-B56E-BE3693D1D0E4}" srcOrd="0" destOrd="3" presId="urn:microsoft.com/office/officeart/2005/8/layout/hList3"/>
     <dgm:cxn modelId="{AA9AD4E0-223E-4DEF-B9E6-31B5A6289BE9}" srcId="{9C6AE864-0578-495D-BCF5-E0F9F3FC7F3D}" destId="{724F98F4-D5C3-4B47-B47B-9CDB04924D30}" srcOrd="5" destOrd="0" parTransId="{2CD8BFD4-E7C9-4253-BA96-BD63C00DBAB9}" sibTransId="{6E9C90A7-4A3F-4937-9213-34B873542250}"/>
+    <dgm:cxn modelId="{16CFF280-2E9D-487D-BB54-A3EB344F8E90}" srcId="{9C6AE864-0578-495D-BCF5-E0F9F3FC7F3D}" destId="{9FEDEA84-1978-4510-BEC2-46429310148C}" srcOrd="2" destOrd="0" parTransId="{04712D8D-6A72-4D09-866D-FA93371A59E8}" sibTransId="{FEB71D72-F91C-4928-8C25-41CA51D95FB1}"/>
+    <dgm:cxn modelId="{CA0B1D53-F5E0-4F4E-8653-AECFE568619F}" srcId="{AC594B83-455D-42D1-9659-899920411875}" destId="{C49DA879-8C74-4FD0-96F9-1DC19AAC4401}" srcOrd="3" destOrd="0" parTransId="{486587EF-3D94-4004-957E-A6137D83E578}" sibTransId="{9E813524-0DB3-474D-A032-CA374AA6E38F}"/>
     <dgm:cxn modelId="{EEBF63EB-57DD-4990-8C8C-1A7EE6F9374C}" type="presOf" srcId="{2D3E8EE7-B26E-4483-BDF5-5FE72E282F85}" destId="{B8C9D060-50A3-4A8C-8965-8D1B754D9E9B}" srcOrd="0" destOrd="5" presId="urn:microsoft.com/office/officeart/2005/8/layout/hList3"/>
-    <dgm:cxn modelId="{CA0B1D53-F5E0-4F4E-8653-AECFE568619F}" srcId="{AC594B83-455D-42D1-9659-899920411875}" destId="{C49DA879-8C74-4FD0-96F9-1DC19AAC4401}" srcOrd="3" destOrd="0" parTransId="{486587EF-3D94-4004-957E-A6137D83E578}" sibTransId="{9E813524-0DB3-474D-A032-CA374AA6E38F}"/>
-    <dgm:cxn modelId="{16CFF280-2E9D-487D-BB54-A3EB344F8E90}" srcId="{9C6AE864-0578-495D-BCF5-E0F9F3FC7F3D}" destId="{9FEDEA84-1978-4510-BEC2-46429310148C}" srcOrd="2" destOrd="0" parTransId="{04712D8D-6A72-4D09-866D-FA93371A59E8}" sibTransId="{FEB71D72-F91C-4928-8C25-41CA51D95FB1}"/>
     <dgm:cxn modelId="{7DE6609D-4060-42DD-9631-187ACE5EC15F}" srcId="{AC594B83-455D-42D1-9659-899920411875}" destId="{2D3E8EE7-B26E-4483-BDF5-5FE72E282F85}" srcOrd="4" destOrd="0" parTransId="{248E07FF-A971-4DEE-A763-E88CC9F75750}" sibTransId="{481C0EAD-B780-4D69-BD86-CA72C0E4EF49}"/>
     <dgm:cxn modelId="{0C8E655F-8877-47C4-B2B9-66AC32E11FD5}" type="presOf" srcId="{6099C24C-12A6-43F9-A726-E53080D841CF}" destId="{39AFFEE0-44E2-424A-BF6C-12DAAE1E84C5}" srcOrd="0" destOrd="0" presId="urn:microsoft.com/office/officeart/2005/8/layout/hList3"/>
     <dgm:cxn modelId="{094206E6-8835-451B-87C4-0E3816644DEF}" srcId="{8A42BD3A-8099-4EF0-8180-805BF10D20AB}" destId="{2DA4FE64-806F-4866-BA1F-FFAA2641EC78}" srcOrd="3" destOrd="0" parTransId="{F3CC7A28-90A1-4C81-9677-705399FB5237}" sibTransId="{87F26749-470D-4410-A6DF-4F0544FA552D}"/>
@@ -3707,7 +3707,7 @@
             <a:fld id="{A5EEFDE4-20F3-400B-B586-D1755F1D251F}" type="datetimeFigureOut">
               <a:rPr lang="en-US" smtClean="0"/>
               <a:pPr/>
-              <a:t>12/1/2009</a:t>
+              <a:t>12/2/2009</a:t>
             </a:fld>
             <a:endParaRPr lang="en-US"/>
           </a:p>
@@ -4558,7 +4558,11 @@
             </a:r>
             <a:r>
               <a:rPr lang="es-AR" baseline="0" dirty="0" smtClean="0"/>
-              <a:t> ( refrigerado, </a:t>
+              <a:t> </a:t>
+            </a:r>
+            <a:r>
+              <a:rPr lang="es-AR" baseline="0" dirty="0" smtClean="0"/>
+              <a:t>( refrigerado, </a:t>
             </a:r>
             <a:r>
               <a:rPr lang="es-AR" baseline="0" dirty="0" err="1" smtClean="0"/>
@@ -4568,6 +4572,292 @@
               <a:rPr lang="es-AR" baseline="0" dirty="0" smtClean="0"/>
               <a:t>)</a:t>
             </a:r>
+          </a:p>
+          <a:p>
+            <a:endParaRPr lang="es-AR" baseline="0" dirty="0" smtClean="0"/>
+          </a:p>
+          <a:p>
+            <a:pPr lvl="0"/>
+            <a:r>
+              <a:rPr lang="es-AR" sz="1200" kern="1200" dirty="0" smtClean="0">
+                <a:solidFill>
+                  <a:schemeClr val="tx1"/>
+                </a:solidFill>
+                <a:latin typeface="+mn-lt"/>
+                <a:ea typeface="+mn-ea"/>
+                <a:cs typeface="+mn-cs"/>
+              </a:rPr>
+              <a:t>Unidad indivisible a ser enviada.</a:t>
+            </a:r>
+          </a:p>
+          <a:p>
+            <a:pPr lvl="0"/>
+            <a:r>
+              <a:rPr lang="es-AR" sz="1200" kern="1200" dirty="0" smtClean="0">
+                <a:solidFill>
+                  <a:schemeClr val="tx1"/>
+                </a:solidFill>
+                <a:latin typeface="+mn-lt"/>
+                <a:ea typeface="+mn-ea"/>
+                <a:cs typeface="+mn-cs"/>
+              </a:rPr>
+              <a:t>Se obtiene de la división del pedido.</a:t>
+            </a:r>
+          </a:p>
+          <a:p>
+            <a:pPr lvl="0"/>
+            <a:r>
+              <a:rPr lang="es-AR" sz="1200" kern="1200" dirty="0" smtClean="0">
+                <a:solidFill>
+                  <a:schemeClr val="tx1"/>
+                </a:solidFill>
+                <a:latin typeface="+mn-lt"/>
+                <a:ea typeface="+mn-ea"/>
+                <a:cs typeface="+mn-cs"/>
+              </a:rPr>
+              <a:t>Se lo tipifica.</a:t>
+            </a:r>
+          </a:p>
+          <a:p>
+            <a:pPr lvl="0"/>
+            <a:r>
+              <a:rPr lang="es-AR" sz="1200" kern="1200" dirty="0" smtClean="0">
+                <a:solidFill>
+                  <a:schemeClr val="tx1"/>
+                </a:solidFill>
+                <a:latin typeface="+mn-lt"/>
+                <a:ea typeface="+mn-ea"/>
+                <a:cs typeface="+mn-cs"/>
+              </a:rPr>
+              <a:t>Se le asigna prioridad. </a:t>
+            </a:r>
+          </a:p>
+          <a:p>
+            <a:pPr lvl="0"/>
+            <a:r>
+              <a:rPr lang="es-AR" sz="1200" kern="1200" dirty="0" smtClean="0">
+                <a:solidFill>
+                  <a:schemeClr val="tx1"/>
+                </a:solidFill>
+                <a:latin typeface="+mn-lt"/>
+                <a:ea typeface="+mn-ea"/>
+                <a:cs typeface="+mn-cs"/>
+              </a:rPr>
+              <a:t>Se le asigna transporte.</a:t>
+            </a:r>
+          </a:p>
+          <a:p>
+            <a:pPr lvl="0"/>
+            <a:r>
+              <a:rPr lang="es-AR" sz="1200" kern="1200" dirty="0" smtClean="0">
+                <a:solidFill>
+                  <a:schemeClr val="tx1"/>
+                </a:solidFill>
+                <a:latin typeface="+mn-lt"/>
+                <a:ea typeface="+mn-ea"/>
+                <a:cs typeface="+mn-cs"/>
+              </a:rPr>
+              <a:t>Se le asocia un tramo.</a:t>
+            </a:r>
+          </a:p>
+          <a:p>
+            <a:pPr lvl="0"/>
+            <a:r>
+              <a:rPr lang="es-AR" sz="1200" kern="1200" dirty="0" smtClean="0">
+                <a:solidFill>
+                  <a:schemeClr val="tx1"/>
+                </a:solidFill>
+                <a:latin typeface="+mn-lt"/>
+                <a:ea typeface="+mn-ea"/>
+                <a:cs typeface="+mn-cs"/>
+              </a:rPr>
+              <a:t>Se lo puedo almacenar.</a:t>
+            </a:r>
+          </a:p>
+          <a:p>
+            <a:pPr lvl="0"/>
+            <a:r>
+              <a:rPr lang="es-AR" sz="1200" kern="1200" dirty="0" smtClean="0">
+                <a:solidFill>
+                  <a:schemeClr val="tx1"/>
+                </a:solidFill>
+                <a:latin typeface="+mn-lt"/>
+                <a:ea typeface="+mn-ea"/>
+                <a:cs typeface="+mn-cs"/>
+              </a:rPr>
+              <a:t>Se puede consultar la ultima</a:t>
+            </a:r>
+            <a:br>
+              <a:rPr lang="es-AR" sz="1200" kern="1200" dirty="0" smtClean="0">
+                <a:solidFill>
+                  <a:schemeClr val="tx1"/>
+                </a:solidFill>
+                <a:latin typeface="+mn-lt"/>
+                <a:ea typeface="+mn-ea"/>
+                <a:cs typeface="+mn-cs"/>
+              </a:rPr>
+            </a:br>
+            <a:r>
+              <a:rPr lang="es-AR" sz="1200" kern="1200" dirty="0" smtClean="0">
+                <a:solidFill>
+                  <a:schemeClr val="tx1"/>
+                </a:solidFill>
+                <a:latin typeface="+mn-lt"/>
+                <a:ea typeface="+mn-ea"/>
+                <a:cs typeface="+mn-cs"/>
+              </a:rPr>
+              <a:t> </a:t>
+            </a:r>
+            <a:r>
+              <a:rPr lang="es-AR" sz="1200" kern="1200" dirty="0" err="1" smtClean="0">
+                <a:solidFill>
+                  <a:schemeClr val="tx1"/>
+                </a:solidFill>
+                <a:latin typeface="+mn-lt"/>
+                <a:ea typeface="+mn-ea"/>
+                <a:cs typeface="+mn-cs"/>
+              </a:rPr>
+              <a:t>úbicacion</a:t>
+            </a:r>
+            <a:r>
+              <a:rPr lang="es-AR" sz="1200" kern="1200" dirty="0" smtClean="0">
+                <a:solidFill>
+                  <a:schemeClr val="tx1"/>
+                </a:solidFill>
+                <a:latin typeface="+mn-lt"/>
+                <a:ea typeface="+mn-ea"/>
+                <a:cs typeface="+mn-cs"/>
+              </a:rPr>
+              <a:t> </a:t>
+            </a:r>
+          </a:p>
+          <a:p>
+            <a:r>
+              <a:rPr lang="es-AR" sz="1200" kern="1200" dirty="0" smtClean="0">
+                <a:solidFill>
+                  <a:schemeClr val="tx1"/>
+                </a:solidFill>
+                <a:latin typeface="+mn-lt"/>
+                <a:ea typeface="+mn-ea"/>
+                <a:cs typeface="+mn-cs"/>
+              </a:rPr>
+              <a:t> </a:t>
+            </a:r>
+          </a:p>
+          <a:p>
+            <a:r>
+              <a:rPr lang="es-AR" sz="1200" kern="1200" dirty="0" smtClean="0">
+                <a:solidFill>
+                  <a:schemeClr val="tx1"/>
+                </a:solidFill>
+                <a:latin typeface="+mn-lt"/>
+                <a:ea typeface="+mn-ea"/>
+                <a:cs typeface="+mn-cs"/>
+              </a:rPr>
+              <a:t>Separación de la carga en bulto.</a:t>
+            </a:r>
+          </a:p>
+          <a:p>
+            <a:r>
+              <a:rPr lang="es-AR" sz="1200" kern="1200" dirty="0" smtClean="0">
+                <a:solidFill>
+                  <a:schemeClr val="tx1"/>
+                </a:solidFill>
+                <a:latin typeface="+mn-lt"/>
+                <a:ea typeface="+mn-ea"/>
+                <a:cs typeface="+mn-cs"/>
+              </a:rPr>
+              <a:t>El problema que se nos presentó con las cargas es la forma  en que se éstas iban a ser transportadas. Dado que  la carga provista por el cliente puede estar conformada  de varias partes divisibles y  quizás las mismas requieran de distintos tipos de transporte o ir por caminos diferentes, una decisión que tomamos con respecto a esto  es  trabajar con unidades indivisibles, el área de operaciones(es el área que se encarga del transporte de la logística) separa la carga en </a:t>
+            </a:r>
+            <a:r>
+              <a:rPr lang="es-AR" sz="1200" b="1" kern="1200" dirty="0" smtClean="0">
+                <a:solidFill>
+                  <a:schemeClr val="tx1"/>
+                </a:solidFill>
+                <a:latin typeface="+mn-lt"/>
+                <a:ea typeface="+mn-ea"/>
+                <a:cs typeface="+mn-cs"/>
+              </a:rPr>
+              <a:t>bultos</a:t>
+            </a:r>
+            <a:r>
+              <a:rPr lang="es-AR" sz="1200" kern="1200" dirty="0" smtClean="0">
+                <a:solidFill>
+                  <a:schemeClr val="tx1"/>
+                </a:solidFill>
+                <a:latin typeface="+mn-lt"/>
+                <a:ea typeface="+mn-ea"/>
+                <a:cs typeface="+mn-cs"/>
+              </a:rPr>
+              <a:t>.  Una vez hecha esta separación se procede a clasificar las distintas partes de la carga, según las características que nos brinda el cliente emisor. A cada bulto se le asigna  una especificación de ruta, es decir los tramos por los que va a transitar el mismo. </a:t>
+            </a:r>
+          </a:p>
+          <a:p>
+            <a:r>
+              <a:rPr lang="es-AR" sz="1200" kern="1200" dirty="0" smtClean="0">
+                <a:solidFill>
+                  <a:schemeClr val="tx1"/>
+                </a:solidFill>
+                <a:latin typeface="+mn-lt"/>
+                <a:ea typeface="+mn-ea"/>
+                <a:cs typeface="+mn-cs"/>
+              </a:rPr>
+              <a:t>Los bultos pueden tener distintos estados, los mismos son actualizados por el área de operaciones. Dichos estados puede ser en almacenamiento, en tránsito o entregado (este tema se verá  más en detalle). Algo que habría que recalcar  es que el sistema permite la consulta al cliente sobre la el estado de cualquiera de los bultos que conforma su carga. </a:t>
+            </a:r>
+          </a:p>
+          <a:p>
+            <a:r>
+              <a:rPr lang="es-AR" sz="1200" kern="1200" dirty="0" smtClean="0">
+                <a:solidFill>
+                  <a:schemeClr val="tx1"/>
+                </a:solidFill>
+                <a:latin typeface="+mn-lt"/>
+                <a:ea typeface="+mn-ea"/>
+                <a:cs typeface="+mn-cs"/>
+              </a:rPr>
+              <a:t> </a:t>
+            </a:r>
+          </a:p>
+          <a:p>
+            <a:r>
+              <a:rPr lang="es-AR" sz="1200" kern="1200" dirty="0" smtClean="0">
+                <a:solidFill>
+                  <a:schemeClr val="tx1"/>
+                </a:solidFill>
+                <a:latin typeface="+mn-lt"/>
+                <a:ea typeface="+mn-ea"/>
+                <a:cs typeface="+mn-cs"/>
+              </a:rPr>
+              <a:t>Otro punto interesante es que los bultos poseen prioridades, lo cual se verá cuando se aborde el tema de la sobre-carga. </a:t>
+            </a:r>
+          </a:p>
+          <a:p>
+            <a:r>
+              <a:rPr lang="es-AR" sz="1200" kern="1200" dirty="0" smtClean="0">
+                <a:solidFill>
+                  <a:schemeClr val="tx1"/>
+                </a:solidFill>
+                <a:latin typeface="+mn-lt"/>
+                <a:ea typeface="+mn-ea"/>
+                <a:cs typeface="+mn-cs"/>
+              </a:rPr>
+              <a:t> </a:t>
+            </a:r>
+          </a:p>
+          <a:p>
+            <a:r>
+              <a:rPr lang="es-AR" sz="1200" kern="1200" dirty="0" smtClean="0">
+                <a:solidFill>
+                  <a:schemeClr val="tx1"/>
+                </a:solidFill>
+                <a:latin typeface="+mn-lt"/>
+                <a:ea typeface="+mn-ea"/>
+                <a:cs typeface="+mn-cs"/>
+              </a:rPr>
+              <a:t>De tratar el traslado de todos los bultos juntos y que todos tengan la misma especificación de ruta,  no resultaría para nada conveniente para el sistema dado que  llevar bultos que requieren o no refrigeración juntos, desaprovecharía capacidad en un  transporte con condicionamientos.  Otro punto que vimos a favor, es que el manejo de bultos da mayor flexibilidad a la hora de la reprogramación de la ruta, dado que resulta más fácil modificar la especificación de ruta para un bulto en particular que para toda la carga completa.</a:t>
+            </a:r>
+          </a:p>
+          <a:p>
             <a:endParaRPr lang="es-AR" dirty="0"/>
           </a:p>
         </p:txBody>
@@ -5035,7 +5325,7 @@
             <a:fld id="{FE1C9E8C-5C2F-489A-9AA4-2270366A0013}" type="datetimeFigureOut">
               <a:rPr lang="es-AR" smtClean="0"/>
               <a:pPr/>
-              <a:t>01/12/2009</a:t>
+              <a:t>02/12/2009</a:t>
             </a:fld>
             <a:endParaRPr lang="es-AR"/>
           </a:p>
@@ -5222,7 +5512,7 @@
             <a:fld id="{FE1C9E8C-5C2F-489A-9AA4-2270366A0013}" type="datetimeFigureOut">
               <a:rPr lang="es-AR" smtClean="0"/>
               <a:pPr/>
-              <a:t>01/12/2009</a:t>
+              <a:t>02/12/2009</a:t>
             </a:fld>
             <a:endParaRPr lang="es-AR"/>
           </a:p>
@@ -5409,7 +5699,7 @@
             <a:fld id="{FE1C9E8C-5C2F-489A-9AA4-2270366A0013}" type="datetimeFigureOut">
               <a:rPr lang="es-AR" smtClean="0"/>
               <a:pPr/>
-              <a:t>01/12/2009</a:t>
+              <a:t>02/12/2009</a:t>
             </a:fld>
             <a:endParaRPr lang="es-AR"/>
           </a:p>
@@ -5596,7 +5886,7 @@
             <a:fld id="{FE1C9E8C-5C2F-489A-9AA4-2270366A0013}" type="datetimeFigureOut">
               <a:rPr lang="es-AR" smtClean="0"/>
               <a:pPr/>
-              <a:t>01/12/2009</a:t>
+              <a:t>02/12/2009</a:t>
             </a:fld>
             <a:endParaRPr lang="es-AR"/>
           </a:p>
@@ -5979,7 +6269,7 @@
             <a:fld id="{FE1C9E8C-5C2F-489A-9AA4-2270366A0013}" type="datetimeFigureOut">
               <a:rPr lang="es-AR" smtClean="0"/>
               <a:pPr/>
-              <a:t>01/12/2009</a:t>
+              <a:t>02/12/2009</a:t>
             </a:fld>
             <a:endParaRPr lang="es-AR"/>
           </a:p>
@@ -6250,7 +6540,7 @@
             <a:fld id="{FE1C9E8C-5C2F-489A-9AA4-2270366A0013}" type="datetimeFigureOut">
               <a:rPr lang="es-AR" smtClean="0"/>
               <a:pPr/>
-              <a:t>01/12/2009</a:t>
+              <a:t>02/12/2009</a:t>
             </a:fld>
             <a:endParaRPr lang="es-AR"/>
           </a:p>
@@ -6637,7 +6927,7 @@
             <a:fld id="{FE1C9E8C-5C2F-489A-9AA4-2270366A0013}" type="datetimeFigureOut">
               <a:rPr lang="es-AR" smtClean="0"/>
               <a:pPr/>
-              <a:t>01/12/2009</a:t>
+              <a:t>02/12/2009</a:t>
             </a:fld>
             <a:endParaRPr lang="es-AR"/>
           </a:p>
@@ -6760,7 +7050,7 @@
             <a:fld id="{FE1C9E8C-5C2F-489A-9AA4-2270366A0013}" type="datetimeFigureOut">
               <a:rPr lang="es-AR" smtClean="0"/>
               <a:pPr/>
-              <a:t>01/12/2009</a:t>
+              <a:t>02/12/2009</a:t>
             </a:fld>
             <a:endParaRPr lang="es-AR"/>
           </a:p>
@@ -6942,7 +7232,7 @@
             <a:fld id="{FE1C9E8C-5C2F-489A-9AA4-2270366A0013}" type="datetimeFigureOut">
               <a:rPr lang="es-AR" smtClean="0"/>
               <a:pPr/>
-              <a:t>01/12/2009</a:t>
+              <a:t>02/12/2009</a:t>
             </a:fld>
             <a:endParaRPr lang="es-AR"/>
           </a:p>
@@ -7278,7 +7568,7 @@
             <a:fld id="{FE1C9E8C-5C2F-489A-9AA4-2270366A0013}" type="datetimeFigureOut">
               <a:rPr lang="es-AR" smtClean="0"/>
               <a:pPr/>
-              <a:t>01/12/2009</a:t>
+              <a:t>02/12/2009</a:t>
             </a:fld>
             <a:endParaRPr lang="es-AR"/>
           </a:p>
@@ -7649,7 +7939,7 @@
             <a:fld id="{FE1C9E8C-5C2F-489A-9AA4-2270366A0013}" type="datetimeFigureOut">
               <a:rPr lang="es-AR" smtClean="0"/>
               <a:pPr/>
-              <a:t>01/12/2009</a:t>
+              <a:t>02/12/2009</a:t>
             </a:fld>
             <a:endParaRPr lang="es-AR"/>
           </a:p>
@@ -8069,7 +8359,7 @@
             <a:fld id="{FE1C9E8C-5C2F-489A-9AA4-2270366A0013}" type="datetimeFigureOut">
               <a:rPr lang="es-AR" smtClean="0"/>
               <a:pPr/>
-              <a:t>01/12/2009</a:t>
+              <a:t>02/12/2009</a:t>
             </a:fld>
             <a:endParaRPr lang="es-AR"/>
           </a:p>
@@ -8629,25 +8919,8 @@
                   </a:schemeClr>
                 </a:solidFill>
               </a:rPr>
-              <a:t>, Pablo			</a:t>
-            </a:r>
-            <a:r>
-              <a:rPr lang="es-AR" sz="1500" dirty="0" smtClean="0">
-                <a:solidFill>
-                  <a:schemeClr val="bg1">
-                    <a:lumMod val="65000"/>
-                  </a:schemeClr>
-                </a:solidFill>
-              </a:rPr>
-              <a:t>84371</a:t>
-            </a:r>
-            <a:endParaRPr lang="es-AR" sz="1500" dirty="0" smtClean="0">
-              <a:solidFill>
-                <a:schemeClr val="bg1">
-                  <a:lumMod val="65000"/>
-                </a:schemeClr>
-              </a:solidFill>
-            </a:endParaRPr>
+              <a:t>, Pablo			84371</a:t>
+            </a:r>
           </a:p>
           <a:p>
             <a:pPr marL="0" lvl="0" algn="l">
@@ -8694,25 +8967,8 @@
                   </a:schemeClr>
                 </a:solidFill>
               </a:rPr>
-              <a:t>Ferro, Flavio Edgardo		</a:t>
-            </a:r>
-            <a:r>
-              <a:rPr lang="es-AR" sz="1500" dirty="0" smtClean="0">
-                <a:solidFill>
-                  <a:schemeClr val="bg1">
-                    <a:lumMod val="65000"/>
-                  </a:schemeClr>
-                </a:solidFill>
-              </a:rPr>
-              <a:t>87187</a:t>
-            </a:r>
-            <a:endParaRPr lang="es-AR" sz="1500" dirty="0" smtClean="0">
-              <a:solidFill>
-                <a:schemeClr val="bg1">
-                  <a:lumMod val="65000"/>
-                </a:schemeClr>
-              </a:solidFill>
-            </a:endParaRPr>
+              <a:t>Ferro, Flavio Edgardo		87187</a:t>
+            </a:r>
           </a:p>
           <a:p>
             <a:pPr marL="0" lvl="0" algn="l">
@@ -8779,8 +9035,17 @@
                   </a:schemeClr>
                 </a:solidFill>
               </a:rPr>
-              <a:t>, Darío		</a:t>
-            </a:r>
+              <a:t>, Darío		83514</a:t>
+            </a:r>
+          </a:p>
+          <a:p>
+            <a:pPr marL="0" lvl="0" algn="l">
+              <a:spcBef>
+                <a:spcPts val="600"/>
+              </a:spcBef>
+              <a:buSzPct val="70000"/>
+              <a:defRPr/>
+            </a:pPr>
             <a:r>
               <a:rPr lang="es-AR" sz="1500" dirty="0" smtClean="0">
                 <a:solidFill>
@@ -8789,51 +9054,8 @@
                   </a:schemeClr>
                 </a:solidFill>
               </a:rPr>
-              <a:t>83514</a:t>
-            </a:r>
-            <a:endParaRPr lang="es-AR" sz="1500" dirty="0" smtClean="0">
-              <a:solidFill>
-                <a:schemeClr val="bg1">
-                  <a:lumMod val="65000"/>
-                </a:schemeClr>
-              </a:solidFill>
-            </a:endParaRPr>
-          </a:p>
-          <a:p>
-            <a:pPr marL="0" lvl="0" algn="l">
-              <a:spcBef>
-                <a:spcPts val="600"/>
-              </a:spcBef>
-              <a:buSzPct val="70000"/>
-              <a:defRPr/>
-            </a:pPr>
-            <a:r>
-              <a:rPr lang="es-AR" sz="1500" dirty="0" smtClean="0">
-                <a:solidFill>
-                  <a:schemeClr val="bg1">
-                    <a:lumMod val="65000"/>
-                  </a:schemeClr>
-                </a:solidFill>
-              </a:rPr>
-              <a:t>Rodríguez, Laura Guillermina	</a:t>
-            </a:r>
-            <a:r>
-              <a:rPr lang="es-AR" sz="1500" dirty="0" smtClean="0">
-                <a:solidFill>
-                  <a:schemeClr val="bg1">
-                    <a:lumMod val="65000"/>
-                  </a:schemeClr>
-                </a:solidFill>
-              </a:rPr>
-              <a:t>79958</a:t>
-            </a:r>
-            <a:endParaRPr lang="es-AR" sz="1500" dirty="0" smtClean="0">
-              <a:solidFill>
-                <a:schemeClr val="bg1">
-                  <a:lumMod val="65000"/>
-                </a:schemeClr>
-              </a:solidFill>
-            </a:endParaRPr>
+              <a:t>Rodríguez, Laura Guillermina	79958</a:t>
+            </a:r>
           </a:p>
           <a:p>
             <a:pPr algn="l"/>
@@ -9214,15 +9436,7 @@
             <a:pPr lvl="1"/>
             <a:r>
               <a:rPr lang="es-AR" dirty="0" smtClean="0"/>
-              <a:t>Objetivo – Alcance </a:t>
-            </a:r>
-            <a:r>
-              <a:rPr lang="es-AR" dirty="0" smtClean="0"/>
-              <a:t>– Fuera de Alcance – Hipótesis </a:t>
-            </a:r>
-            <a:r>
-              <a:rPr lang="es-AR" dirty="0" smtClean="0"/>
-              <a:t>(</a:t>
+              <a:t>Objetivo – Alcance – Fuera de Alcance – Hipótesis (</a:t>
             </a:r>
             <a:r>
               <a:rPr lang="es-AR" dirty="0" err="1" smtClean="0"/>
@@ -9240,7 +9454,6 @@
               <a:rPr lang="es-AR" dirty="0" smtClean="0"/>
               <a:t>)</a:t>
             </a:r>
-            <a:endParaRPr lang="es-AR" dirty="0" smtClean="0"/>
           </a:p>
           <a:p>
             <a:pPr lvl="1"/>
@@ -9250,11 +9463,7 @@
             <a:pPr lvl="1"/>
             <a:r>
               <a:rPr lang="es-AR" dirty="0" smtClean="0"/>
-              <a:t>Modelo de </a:t>
-            </a:r>
-            <a:r>
-              <a:rPr lang="es-AR" dirty="0" smtClean="0"/>
-              <a:t>Negocio (</a:t>
+              <a:t>Modelo de Negocio (</a:t>
             </a:r>
             <a:r>
               <a:rPr lang="es-AR" dirty="0" err="1" smtClean="0"/>
@@ -9264,7 +9473,6 @@
               <a:rPr lang="es-AR" dirty="0" smtClean="0"/>
               <a:t>)</a:t>
             </a:r>
-            <a:endParaRPr lang="es-AR" dirty="0" smtClean="0"/>
           </a:p>
           <a:p>
             <a:pPr lvl="1"/>
@@ -9274,11 +9482,7 @@
             <a:pPr lvl="1"/>
             <a:r>
               <a:rPr lang="es-AR" dirty="0" smtClean="0"/>
-              <a:t>Casos de </a:t>
-            </a:r>
-            <a:r>
-              <a:rPr lang="es-AR" dirty="0" smtClean="0"/>
-              <a:t>Uso (</a:t>
+              <a:t>Casos de Uso (</a:t>
             </a:r>
             <a:r>
               <a:rPr lang="es-AR" dirty="0" err="1" smtClean="0"/>
@@ -9288,7 +9492,6 @@
               <a:rPr lang="es-AR" dirty="0" smtClean="0"/>
               <a:t>)</a:t>
             </a:r>
-            <a:endParaRPr lang="es-AR" dirty="0" smtClean="0"/>
           </a:p>
           <a:p>
             <a:pPr lvl="1"/>
@@ -9319,7 +9522,6 @@
               <a:rPr lang="es-AR" dirty="0" smtClean="0"/>
               <a:t>)</a:t>
             </a:r>
-            <a:endParaRPr lang="es-AR" dirty="0" smtClean="0"/>
           </a:p>
           <a:p>
             <a:pPr lvl="2"/>
@@ -9343,7 +9545,6 @@
               <a:rPr lang="es-AR" dirty="0" smtClean="0"/>
               <a:t>)</a:t>
             </a:r>
-            <a:endParaRPr lang="es-AR" dirty="0" smtClean="0"/>
           </a:p>
           <a:p>
             <a:pPr lvl="2"/>
@@ -9366,7 +9567,6 @@
               <a:rPr lang="es-AR" dirty="0" smtClean="0"/>
               <a:t>)</a:t>
             </a:r>
-            <a:endParaRPr lang="es-AR" dirty="0" smtClean="0"/>
           </a:p>
           <a:p>
             <a:pPr lvl="2"/>
@@ -9395,7 +9595,6 @@
               <a:rPr lang="es-AR" dirty="0" smtClean="0"/>
               <a:t>Conclusiones (dependiendo como nos quede el discurso)</a:t>
             </a:r>
-            <a:endParaRPr lang="es-AR" dirty="0" smtClean="0"/>
           </a:p>
           <a:p>
             <a:pPr lvl="2">
@@ -9407,11 +9606,7 @@
             <a:pPr lvl="1"/>
             <a:r>
               <a:rPr lang="es-AR" dirty="0" smtClean="0"/>
-              <a:t>Preguntas </a:t>
-            </a:r>
-            <a:r>
-              <a:rPr lang="es-AR" dirty="0" smtClean="0"/>
-              <a:t>y Respuestas </a:t>
+              <a:t>Preguntas y Respuestas </a:t>
             </a:r>
           </a:p>
           <a:p>
@@ -10822,11 +11017,7 @@
           <a:p>
             <a:r>
               <a:rPr lang="es-AR" dirty="0" smtClean="0"/>
-              <a:t>Se </a:t>
-            </a:r>
-            <a:r>
-              <a:rPr lang="es-AR" dirty="0" smtClean="0"/>
-              <a:t>le asigna transporte.</a:t>
+              <a:t>Se le asigna transporte.</a:t>
             </a:r>
           </a:p>
           <a:p>

</xml_diff>

<commit_message>
modificacion en la diapositiva: Manejo de cargas
</commit_message>
<xml_diff>
--- a/TodoMundo/Presentación/Presentacion.pptx
+++ b/TodoMundo/Presentación/Presentacion.pptx
@@ -2,7 +2,7 @@
 <file path=ppt/presentation.xml><?xml version="1.0" encoding="utf-8"?>
 <p:presentation xmlns:a="http://schemas.openxmlformats.org/drawingml/2006/main" xmlns:r="http://schemas.openxmlformats.org/officeDocument/2006/relationships" xmlns:p="http://schemas.openxmlformats.org/presentationml/2006/main" saveSubsetFonts="1">
   <p:sldMasterIdLst>
-    <p:sldMasterId id="2147483672" r:id="rId1"/>
+    <p:sldMasterId id="2147483732" r:id="rId1"/>
   </p:sldMasterIdLst>
   <p:notesMasterIdLst>
     <p:notesMasterId r:id="rId14"/>
@@ -1781,9 +1781,9 @@
     <dgm:cxn modelId="{8D90936B-588F-4878-9F09-443FA0AB48CC}" type="presOf" srcId="{794F3E27-C02F-43EB-BB87-3BB32B972093}" destId="{F9B45773-AEDC-4709-9FD2-ED5D18B7C2C6}" srcOrd="0" destOrd="0" presId="urn:microsoft.com/office/officeart/2005/8/layout/hList3"/>
     <dgm:cxn modelId="{8AD3841A-638D-4937-84F0-2C83464B4C80}" type="presOf" srcId="{9FEDEA84-1978-4510-BEC2-46429310148C}" destId="{555023A0-0C75-4234-B56E-BE3693D1D0E4}" srcOrd="0" destOrd="3" presId="urn:microsoft.com/office/officeart/2005/8/layout/hList3"/>
     <dgm:cxn modelId="{AA9AD4E0-223E-4DEF-B9E6-31B5A6289BE9}" srcId="{9C6AE864-0578-495D-BCF5-E0F9F3FC7F3D}" destId="{724F98F4-D5C3-4B47-B47B-9CDB04924D30}" srcOrd="5" destOrd="0" parTransId="{2CD8BFD4-E7C9-4253-BA96-BD63C00DBAB9}" sibTransId="{6E9C90A7-4A3F-4937-9213-34B873542250}"/>
+    <dgm:cxn modelId="{EEBF63EB-57DD-4990-8C8C-1A7EE6F9374C}" type="presOf" srcId="{2D3E8EE7-B26E-4483-BDF5-5FE72E282F85}" destId="{B8C9D060-50A3-4A8C-8965-8D1B754D9E9B}" srcOrd="0" destOrd="5" presId="urn:microsoft.com/office/officeart/2005/8/layout/hList3"/>
+    <dgm:cxn modelId="{CA0B1D53-F5E0-4F4E-8653-AECFE568619F}" srcId="{AC594B83-455D-42D1-9659-899920411875}" destId="{C49DA879-8C74-4FD0-96F9-1DC19AAC4401}" srcOrd="3" destOrd="0" parTransId="{486587EF-3D94-4004-957E-A6137D83E578}" sibTransId="{9E813524-0DB3-474D-A032-CA374AA6E38F}"/>
     <dgm:cxn modelId="{16CFF280-2E9D-487D-BB54-A3EB344F8E90}" srcId="{9C6AE864-0578-495D-BCF5-E0F9F3FC7F3D}" destId="{9FEDEA84-1978-4510-BEC2-46429310148C}" srcOrd="2" destOrd="0" parTransId="{04712D8D-6A72-4D09-866D-FA93371A59E8}" sibTransId="{FEB71D72-F91C-4928-8C25-41CA51D95FB1}"/>
-    <dgm:cxn modelId="{CA0B1D53-F5E0-4F4E-8653-AECFE568619F}" srcId="{AC594B83-455D-42D1-9659-899920411875}" destId="{C49DA879-8C74-4FD0-96F9-1DC19AAC4401}" srcOrd="3" destOrd="0" parTransId="{486587EF-3D94-4004-957E-A6137D83E578}" sibTransId="{9E813524-0DB3-474D-A032-CA374AA6E38F}"/>
-    <dgm:cxn modelId="{EEBF63EB-57DD-4990-8C8C-1A7EE6F9374C}" type="presOf" srcId="{2D3E8EE7-B26E-4483-BDF5-5FE72E282F85}" destId="{B8C9D060-50A3-4A8C-8965-8D1B754D9E9B}" srcOrd="0" destOrd="5" presId="urn:microsoft.com/office/officeart/2005/8/layout/hList3"/>
     <dgm:cxn modelId="{7DE6609D-4060-42DD-9631-187ACE5EC15F}" srcId="{AC594B83-455D-42D1-9659-899920411875}" destId="{2D3E8EE7-B26E-4483-BDF5-5FE72E282F85}" srcOrd="4" destOrd="0" parTransId="{248E07FF-A971-4DEE-A763-E88CC9F75750}" sibTransId="{481C0EAD-B780-4D69-BD86-CA72C0E4EF49}"/>
     <dgm:cxn modelId="{0C8E655F-8877-47C4-B2B9-66AC32E11FD5}" type="presOf" srcId="{6099C24C-12A6-43F9-A726-E53080D841CF}" destId="{39AFFEE0-44E2-424A-BF6C-12DAAE1E84C5}" srcOrd="0" destOrd="0" presId="urn:microsoft.com/office/officeart/2005/8/layout/hList3"/>
     <dgm:cxn modelId="{094206E6-8835-451B-87C4-0E3816644DEF}" srcId="{8A42BD3A-8099-4EF0-8180-805BF10D20AB}" destId="{2DA4FE64-806F-4866-BA1F-FFAA2641EC78}" srcOrd="3" destOrd="0" parTransId="{F3CC7A28-90A1-4C81-9677-705399FB5237}" sibTransId="{87F26749-470D-4410-A6DF-4F0544FA552D}"/>
@@ -1806,7 +1806,7 @@
   <dgm:whole/>
   <dgm:extLst>
     <a:ext uri="http://schemas.microsoft.com/office/drawing/2008/diagram">
-      <dsp:dataModelExt xmlns:dsp="http://schemas.microsoft.com/office/drawing/2008/diagram" xmlns="" relId="rId7" minVer="http://schemas.openxmlformats.org/drawingml/2006/diagram"/>
+      <dsp:dataModelExt xmlns="" xmlns:dsp="http://schemas.microsoft.com/office/drawing/2008/diagram" relId="rId7" minVer="http://schemas.openxmlformats.org/drawingml/2006/diagram"/>
     </a:ext>
   </dgm:extLst>
 </dgm:dataModel>
@@ -4022,7 +4022,7 @@
             <a:fld id="{6B7DCFDD-9765-4942-8186-4D444FB7394B}" type="slidenum">
               <a:rPr lang="en-US" smtClean="0"/>
               <a:pPr/>
-              <a:t>‹#›</a:t>
+              <a:t>‹Nº›</a:t>
             </a:fld>
             <a:endParaRPr lang="en-US"/>
           </a:p>
@@ -4934,197 +4934,6 @@
           <a:lstStyle/>
           <a:p>
             <a:r>
-              <a:rPr lang="es-AR" dirty="0" smtClean="0"/>
-              <a:t>Carga</a:t>
-            </a:r>
-            <a:r>
-              <a:rPr lang="es-AR" baseline="0" dirty="0" smtClean="0"/>
-              <a:t> </a:t>
-            </a:r>
-            <a:r>
-              <a:rPr lang="es-AR" baseline="0" dirty="0" smtClean="0">
-                <a:sym typeface="Wingdings" pitchFamily="2" charset="2"/>
-              </a:rPr>
-              <a:t> conjunto de bultos que conforman un pedido</a:t>
-            </a:r>
-            <a:endParaRPr lang="es-AR" dirty="0" smtClean="0"/>
-          </a:p>
-          <a:p>
-            <a:r>
-              <a:rPr lang="es-AR" dirty="0" smtClean="0"/>
-              <a:t>Tipifica ( </a:t>
-            </a:r>
-            <a:r>
-              <a:rPr lang="es-AR" dirty="0" err="1" smtClean="0"/>
-              <a:t>dimension</a:t>
-            </a:r>
-            <a:r>
-              <a:rPr lang="es-AR" dirty="0" smtClean="0"/>
-              <a:t>, peso, </a:t>
-            </a:r>
-            <a:r>
-              <a:rPr lang="es-AR" dirty="0" err="1" smtClean="0"/>
-              <a:t>caracteristicas</a:t>
-            </a:r>
-            <a:r>
-              <a:rPr lang="es-AR" baseline="0" dirty="0" smtClean="0"/>
-              <a:t> ( refrigerado, </a:t>
-            </a:r>
-            <a:r>
-              <a:rPr lang="es-AR" baseline="0" dirty="0" err="1" smtClean="0"/>
-              <a:t>fragil</a:t>
-            </a:r>
-            <a:r>
-              <a:rPr lang="es-AR" baseline="0" dirty="0" smtClean="0"/>
-              <a:t>)</a:t>
-            </a:r>
-          </a:p>
-          <a:p>
-            <a:endParaRPr lang="es-AR" baseline="0" dirty="0" smtClean="0"/>
-          </a:p>
-          <a:p>
-            <a:pPr lvl="0"/>
-            <a:r>
-              <a:rPr lang="es-AR" sz="1200" kern="1200" dirty="0" smtClean="0">
-                <a:solidFill>
-                  <a:schemeClr val="tx1"/>
-                </a:solidFill>
-                <a:latin typeface="+mn-lt"/>
-                <a:ea typeface="+mn-ea"/>
-                <a:cs typeface="+mn-cs"/>
-              </a:rPr>
-              <a:t>Unidad indivisible a ser enviada.</a:t>
-            </a:r>
-          </a:p>
-          <a:p>
-            <a:pPr lvl="0"/>
-            <a:r>
-              <a:rPr lang="es-AR" sz="1200" kern="1200" dirty="0" smtClean="0">
-                <a:solidFill>
-                  <a:schemeClr val="tx1"/>
-                </a:solidFill>
-                <a:latin typeface="+mn-lt"/>
-                <a:ea typeface="+mn-ea"/>
-                <a:cs typeface="+mn-cs"/>
-              </a:rPr>
-              <a:t>Se obtiene de la división del pedido.</a:t>
-            </a:r>
-          </a:p>
-          <a:p>
-            <a:pPr lvl="0"/>
-            <a:r>
-              <a:rPr lang="es-AR" sz="1200" kern="1200" dirty="0" smtClean="0">
-                <a:solidFill>
-                  <a:schemeClr val="tx1"/>
-                </a:solidFill>
-                <a:latin typeface="+mn-lt"/>
-                <a:ea typeface="+mn-ea"/>
-                <a:cs typeface="+mn-cs"/>
-              </a:rPr>
-              <a:t>Se lo tipifica.</a:t>
-            </a:r>
-          </a:p>
-          <a:p>
-            <a:pPr lvl="0"/>
-            <a:r>
-              <a:rPr lang="es-AR" sz="1200" kern="1200" dirty="0" smtClean="0">
-                <a:solidFill>
-                  <a:schemeClr val="tx1"/>
-                </a:solidFill>
-                <a:latin typeface="+mn-lt"/>
-                <a:ea typeface="+mn-ea"/>
-                <a:cs typeface="+mn-cs"/>
-              </a:rPr>
-              <a:t>Se le calcula</a:t>
-            </a:r>
-            <a:r>
-              <a:rPr lang="es-AR" sz="1200" kern="1200" baseline="0" dirty="0" smtClean="0">
-                <a:solidFill>
-                  <a:schemeClr val="tx1"/>
-                </a:solidFill>
-                <a:latin typeface="+mn-lt"/>
-                <a:ea typeface="+mn-ea"/>
-                <a:cs typeface="+mn-cs"/>
-              </a:rPr>
-              <a:t> </a:t>
-            </a:r>
-            <a:r>
-              <a:rPr lang="es-AR" sz="1200" kern="1200" dirty="0" smtClean="0">
-                <a:solidFill>
-                  <a:schemeClr val="tx1"/>
-                </a:solidFill>
-                <a:latin typeface="+mn-lt"/>
-                <a:ea typeface="+mn-ea"/>
-                <a:cs typeface="+mn-cs"/>
-              </a:rPr>
-              <a:t>prioridad. </a:t>
-            </a:r>
-          </a:p>
-          <a:p>
-            <a:pPr lvl="0"/>
-            <a:r>
-              <a:rPr lang="es-AR" sz="1200" kern="1200" dirty="0" smtClean="0">
-                <a:solidFill>
-                  <a:schemeClr val="tx1"/>
-                </a:solidFill>
-                <a:latin typeface="+mn-lt"/>
-                <a:ea typeface="+mn-ea"/>
-                <a:cs typeface="+mn-cs"/>
-              </a:rPr>
-              <a:t>Se le asigna transporte.</a:t>
-            </a:r>
-          </a:p>
-          <a:p>
-            <a:pPr lvl="0"/>
-            <a:r>
-              <a:rPr lang="es-AR" sz="1200" kern="1200" dirty="0" smtClean="0">
-                <a:solidFill>
-                  <a:schemeClr val="tx1"/>
-                </a:solidFill>
-                <a:latin typeface="+mn-lt"/>
-                <a:ea typeface="+mn-ea"/>
-                <a:cs typeface="+mn-cs"/>
-              </a:rPr>
-              <a:t>Se lo puedo almacenar.</a:t>
-            </a:r>
-          </a:p>
-          <a:p>
-            <a:pPr lvl="0"/>
-            <a:r>
-              <a:rPr lang="es-AR" sz="1200" kern="1200" dirty="0" smtClean="0">
-                <a:solidFill>
-                  <a:schemeClr val="tx1"/>
-                </a:solidFill>
-                <a:latin typeface="+mn-lt"/>
-                <a:ea typeface="+mn-ea"/>
-                <a:cs typeface="+mn-cs"/>
-              </a:rPr>
-              <a:t>Se puede consultar la ultima</a:t>
-            </a:r>
-            <a:br>
-              <a:rPr lang="es-AR" sz="1200" kern="1200" dirty="0" smtClean="0">
-                <a:solidFill>
-                  <a:schemeClr val="tx1"/>
-                </a:solidFill>
-                <a:latin typeface="+mn-lt"/>
-                <a:ea typeface="+mn-ea"/>
-                <a:cs typeface="+mn-cs"/>
-              </a:rPr>
-            </a:br>
-            <a:r>
-              <a:rPr lang="es-AR" sz="1200" kern="1200" dirty="0" smtClean="0">
-                <a:solidFill>
-                  <a:schemeClr val="tx1"/>
-                </a:solidFill>
-                <a:latin typeface="+mn-lt"/>
-                <a:ea typeface="+mn-ea"/>
-                <a:cs typeface="+mn-cs"/>
-              </a:rPr>
-              <a:t> ubicación </a:t>
-            </a:r>
-          </a:p>
-          <a:p>
-            <a:r>
               <a:rPr lang="es-AR" sz="1200" kern="1200" dirty="0" smtClean="0">
                 <a:solidFill>
                   <a:schemeClr val="tx1"/>
@@ -5135,6 +4944,63 @@
               </a:rPr>
               <a:t> </a:t>
             </a:r>
+            <a:r>
+              <a:rPr lang="es-AR" dirty="0" smtClean="0"/>
+              <a:t>_____________________________________________________________________________________</a:t>
+            </a:r>
+          </a:p>
+          <a:p>
+            <a:r>
+              <a:rPr lang="es-AR" dirty="0" smtClean="0"/>
+              <a:t>Nosotros contamos con un pedido, en el momento que llega el pedido operaciones</a:t>
+            </a:r>
+            <a:r>
+              <a:rPr lang="es-AR" baseline="0" dirty="0" smtClean="0"/>
+              <a:t> hace la división del mismo </a:t>
+            </a:r>
+            <a:r>
+              <a:rPr lang="es-AR" baseline="0" dirty="0" err="1" smtClean="0"/>
+              <a:t>click</a:t>
+            </a:r>
+            <a:endParaRPr lang="es-AR" baseline="0" dirty="0" smtClean="0"/>
+          </a:p>
+          <a:p>
+            <a:r>
+              <a:rPr lang="es-AR" baseline="0" dirty="0" smtClean="0"/>
+              <a:t>De lo que obtenemos de esta división son bultos, esto va a ser la unidad indivisible a ser enviada que vamos a manejar.</a:t>
+            </a:r>
+          </a:p>
+          <a:p>
+            <a:r>
+              <a:rPr lang="es-AR" baseline="0" dirty="0" smtClean="0"/>
+              <a:t>En el momento que se obtiene los bultos se efectúa la clasificación de los mismos. Es aquí donde se determina en base al pedido si un bulto es frágil, requiere refrigeración, se toman las dimensiones del mismo.</a:t>
+            </a:r>
+          </a:p>
+          <a:p>
+            <a:r>
+              <a:rPr lang="es-AR" baseline="0" dirty="0" smtClean="0"/>
+              <a:t>Luego del proceso de tipificación, estos bultos van ha ser asignado a un transporte  en base a su prioridad y la disponibilidad del transporte . En caso de un </a:t>
+            </a:r>
+            <a:r>
+              <a:rPr lang="es-AR" baseline="0" dirty="0" err="1" smtClean="0"/>
+              <a:t>io</a:t>
+            </a:r>
+            <a:r>
+              <a:rPr lang="es-AR" baseline="0" dirty="0" smtClean="0"/>
+              <a:t> va a ser asignado a un almacén que van a estar asociados al punto de operación en el cual se encuentra. </a:t>
+            </a:r>
+          </a:p>
+          <a:p>
+            <a:r>
+              <a:rPr lang="es-AR" baseline="0" dirty="0" smtClean="0"/>
+              <a:t>En cuanto a la consulta  del pedido, contamos con la posibilidad de conocer el estado y ubicación del  pedido, esto se va a explicar mas adelante</a:t>
+            </a:r>
+          </a:p>
+          <a:p>
+            <a:r>
+              <a:rPr lang="es-AR" baseline="0" dirty="0" smtClean="0"/>
+              <a:t>Como mencione anteriormente en la etapa de asignación de un bulto a un transporte o un almacén los mismo cuentan con una prioridad , esto se vera con mas detenimiento cuando abordemos el tema de la reprogramación de ruta.</a:t>
+            </a:r>
           </a:p>
           <a:p>
             <a:r>
@@ -5146,10 +5012,19 @@
                 <a:ea typeface="+mn-ea"/>
                 <a:cs typeface="+mn-cs"/>
               </a:rPr>
-              <a:t>Separación de la carga en bulto.</a:t>
-            </a:r>
-          </a:p>
-          <a:p>
+              <a:t>La ventaja</a:t>
+            </a:r>
+            <a:r>
+              <a:rPr lang="es-AR" sz="1200" kern="1200" baseline="0" dirty="0" smtClean="0">
+                <a:solidFill>
+                  <a:schemeClr val="tx1"/>
+                </a:solidFill>
+                <a:latin typeface="+mn-lt"/>
+                <a:ea typeface="+mn-ea"/>
+                <a:cs typeface="+mn-cs"/>
+              </a:rPr>
+              <a:t> de usar la separación en bultos es tener </a:t>
+            </a:r>
             <a:r>
               <a:rPr lang="es-AR" sz="1200" kern="1200" dirty="0" smtClean="0">
                 <a:solidFill>
@@ -5159,10 +5034,10 @@
                 <a:ea typeface="+mn-ea"/>
                 <a:cs typeface="+mn-cs"/>
               </a:rPr>
-              <a:t>El problema que se nos presentó con las cargas es la forma  en que se éstas iban a ser transportadas. Dado que  la carga provista por el cliente puede estar conformada  de varias partes divisibles y  quizás las mismas requieran de distintos tipos de transporte o ir por caminos diferentes, una decisión que tomamos con respecto a esto  es  trabajar con unidades indivisibles, el área de operaciones(es el área que se encarga del transporte de la logística) separa la carga en </a:t>
-            </a:r>
-            <a:r>
-              <a:rPr lang="es-AR" sz="1200" b="1" kern="1200" dirty="0" smtClean="0">
+              <a:t>mayor flexibilidad a la hora de la reprogramación de la ruta, dado que resulta más fácil modificar la especificación de ruta para un bulto en particular que para toda la carga </a:t>
+            </a:r>
+            <a:r>
+              <a:rPr lang="es-AR" sz="1200" kern="1200" dirty="0" err="1" smtClean="0">
                 <a:solidFill>
                   <a:schemeClr val="tx1"/>
                 </a:solidFill>
@@ -5170,8 +5045,18 @@
                 <a:ea typeface="+mn-ea"/>
                 <a:cs typeface="+mn-cs"/>
               </a:rPr>
-              <a:t>bultos</a:t>
-            </a:r>
+              <a:t>complet</a:t>
+            </a:r>
+            <a:endParaRPr lang="es-AR" sz="1200" kern="1200" dirty="0" smtClean="0">
+              <a:solidFill>
+                <a:schemeClr val="tx1"/>
+              </a:solidFill>
+              <a:latin typeface="+mn-lt"/>
+              <a:ea typeface="+mn-ea"/>
+              <a:cs typeface="+mn-cs"/>
+            </a:endParaRPr>
+          </a:p>
+          <a:p>
             <a:r>
               <a:rPr lang="es-AR" sz="1200" kern="1200" dirty="0" smtClean="0">
                 <a:solidFill>
@@ -5181,7 +5066,7 @@
                 <a:ea typeface="+mn-ea"/>
                 <a:cs typeface="+mn-cs"/>
               </a:rPr>
-              <a:t>.  Una vez hecha esta separación se procede a clasificar las distintas partes de la carga, según las características que nos brinda el cliente emisor. A cada bulto se le asigna  una especificación de ruta, es decir los tramos por los que va a transitar el mismo. </a:t>
+              <a:t>________________________________________________________________________________________</a:t>
             </a:r>
           </a:p>
           <a:p>
@@ -5209,48 +5094,7 @@
               </a:rPr>
               <a:t> </a:t>
             </a:r>
-          </a:p>
-          <a:p>
-            <a:r>
-              <a:rPr lang="es-AR" sz="1200" kern="1200" dirty="0" smtClean="0">
-                <a:solidFill>
-                  <a:schemeClr val="tx1"/>
-                </a:solidFill>
-                <a:latin typeface="+mn-lt"/>
-                <a:ea typeface="+mn-ea"/>
-                <a:cs typeface="+mn-cs"/>
-              </a:rPr>
-              <a:t>Otro punto interesante es que los bultos poseen prioridades, lo cual se verá cuando se aborde el tema de la sobre-carga. </a:t>
-            </a:r>
-          </a:p>
-          <a:p>
-            <a:r>
-              <a:rPr lang="es-AR" sz="1200" kern="1200" dirty="0" smtClean="0">
-                <a:solidFill>
-                  <a:schemeClr val="tx1"/>
-                </a:solidFill>
-                <a:latin typeface="+mn-lt"/>
-                <a:ea typeface="+mn-ea"/>
-                <a:cs typeface="+mn-cs"/>
-              </a:rPr>
-              <a:t> </a:t>
-            </a:r>
-          </a:p>
-          <a:p>
-            <a:r>
-              <a:rPr lang="es-AR" sz="1200" kern="1200" dirty="0" smtClean="0">
-                <a:solidFill>
-                  <a:schemeClr val="tx1"/>
-                </a:solidFill>
-                <a:latin typeface="+mn-lt"/>
-                <a:ea typeface="+mn-ea"/>
-                <a:cs typeface="+mn-cs"/>
-              </a:rPr>
-              <a:t>De tratar el traslado de todos los bultos juntos y que todos tengan la misma especificación de ruta,  no resultaría para nada conveniente para el sistema dado que  llevar bultos que requieren o no refrigeración juntos, desaprovecharía capacidad en un  transporte con condicionamientos.  Otro punto que vimos a favor, es que el manejo de bultos da mayor flexibilidad a la hora de la reprogramación de la ruta, dado que resulta más fácil modificar la especificación de ruta para un bulto en particular que para toda la carga completa.</a:t>
-            </a:r>
-          </a:p>
-          <a:p>
-            <a:endParaRPr lang="es-AR" dirty="0"/>
+            <a:endParaRPr lang="es-AR" dirty="0" smtClean="0"/>
           </a:p>
         </p:txBody>
       </p:sp>
@@ -5332,6 +5176,88 @@
           </a:bodyPr>
           <a:lstStyle/>
           <a:p>
+            <a:endParaRPr lang="es-AR" dirty="0"/>
+          </a:p>
+        </p:txBody>
+      </p:sp>
+      <p:sp>
+        <p:nvSpPr>
+          <p:cNvPr id="4" name="3 Marcador de número de diapositiva"/>
+          <p:cNvSpPr>
+            <a:spLocks noGrp="1"/>
+          </p:cNvSpPr>
+          <p:nvPr>
+            <p:ph type="sldNum" sz="quarter" idx="10"/>
+          </p:nvPr>
+        </p:nvSpPr>
+        <p:spPr/>
+        <p:txBody>
+          <a:bodyPr/>
+          <a:lstStyle/>
+          <a:p>
+            <a:fld id="{6B7DCFDD-9765-4942-8186-4D444FB7394B}" type="slidenum">
+              <a:rPr lang="en-US" smtClean="0"/>
+              <a:pPr/>
+              <a:t>7</a:t>
+            </a:fld>
+            <a:endParaRPr lang="en-US"/>
+          </a:p>
+        </p:txBody>
+      </p:sp>
+    </p:spTree>
+  </p:cSld>
+  <p:clrMapOvr>
+    <a:masterClrMapping/>
+  </p:clrMapOvr>
+</p:notes>
+</file>
+
+<file path=ppt/notesSlides/notesSlide7.xml><?xml version="1.0" encoding="utf-8"?>
+<p:notes xmlns:a="http://schemas.openxmlformats.org/drawingml/2006/main" xmlns:r="http://schemas.openxmlformats.org/officeDocument/2006/relationships" xmlns:p="http://schemas.openxmlformats.org/presentationml/2006/main">
+  <p:cSld>
+    <p:spTree>
+      <p:nvGrpSpPr>
+        <p:cNvPr id="1" name=""/>
+        <p:cNvGrpSpPr/>
+        <p:nvPr/>
+      </p:nvGrpSpPr>
+      <p:grpSpPr>
+        <a:xfrm>
+          <a:off x="0" y="0"/>
+          <a:ext cx="0" cy="0"/>
+          <a:chOff x="0" y="0"/>
+          <a:chExt cx="0" cy="0"/>
+        </a:xfrm>
+      </p:grpSpPr>
+      <p:sp>
+        <p:nvSpPr>
+          <p:cNvPr id="2" name="1 Marcador de imagen de diapositiva"/>
+          <p:cNvSpPr>
+            <a:spLocks noGrp="1" noRot="1" noChangeAspect="1"/>
+          </p:cNvSpPr>
+          <p:nvPr>
+            <p:ph type="sldImg"/>
+          </p:nvPr>
+        </p:nvSpPr>
+        <p:spPr/>
+      </p:sp>
+      <p:sp>
+        <p:nvSpPr>
+          <p:cNvPr id="3" name="2 Marcador de notas"/>
+          <p:cNvSpPr>
+            <a:spLocks noGrp="1"/>
+          </p:cNvSpPr>
+          <p:nvPr>
+            <p:ph type="body" idx="1"/>
+          </p:nvPr>
+        </p:nvSpPr>
+        <p:spPr/>
+        <p:txBody>
+          <a:bodyPr>
+            <a:normAutofit/>
+          </a:bodyPr>
+          <a:lstStyle/>
+          <a:p>
             <a:r>
               <a:rPr lang="es-AR" dirty="0" smtClean="0"/>
               <a:t>DIAGRAMA DE ESTADO DE PEDIDO</a:t>
@@ -5435,7 +5361,7 @@
         </p:nvSpPr>
         <p:spPr>
           <a:xfrm>
-            <a:off x="304802" y="329185"/>
+            <a:off x="304800" y="329184"/>
             <a:ext cx="8532055" cy="6196819"/>
           </a:xfrm>
           <a:prstGeom prst="roundRect">
@@ -5519,7 +5445,7 @@
         </p:nvSpPr>
         <p:spPr>
           <a:xfrm>
-            <a:off x="418597" y="434162"/>
+            <a:off x="418596" y="434162"/>
             <a:ext cx="8306809" cy="3108960"/>
           </a:xfrm>
           <a:prstGeom prst="roundRect">
@@ -5764,7 +5690,7 @@
             <a:fld id="{DEAB1E94-6728-4D22-B98E-AC9E1765F0E2}" type="slidenum">
               <a:rPr lang="es-AR" smtClean="0"/>
               <a:pPr/>
-              <a:t>‹#›</a:t>
+              <a:t>‹Nº›</a:t>
             </a:fld>
             <a:endParaRPr lang="es-AR"/>
           </a:p>
@@ -5951,7 +5877,7 @@
             <a:fld id="{DEAB1E94-6728-4D22-B98E-AC9E1765F0E2}" type="slidenum">
               <a:rPr lang="es-AR" smtClean="0"/>
               <a:pPr/>
-              <a:t>‹#›</a:t>
+              <a:t>‹Nº›</a:t>
             </a:fld>
             <a:endParaRPr lang="es-AR"/>
           </a:p>
@@ -5994,7 +5920,7 @@
         </p:nvSpPr>
         <p:spPr>
           <a:xfrm>
-            <a:off x="6629400" y="533405"/>
+            <a:off x="6629400" y="533404"/>
             <a:ext cx="1981200" cy="5257799"/>
           </a:xfrm>
         </p:spPr>
@@ -6024,7 +5950,7 @@
         </p:nvSpPr>
         <p:spPr>
           <a:xfrm>
-            <a:off x="533400" y="533403"/>
+            <a:off x="533400" y="533402"/>
             <a:ext cx="5943600" cy="5257801"/>
           </a:xfrm>
         </p:spPr>
@@ -6138,7 +6064,7 @@
             <a:fld id="{DEAB1E94-6728-4D22-B98E-AC9E1765F0E2}" type="slidenum">
               <a:rPr lang="es-AR" smtClean="0"/>
               <a:pPr/>
-              <a:t>‹#›</a:t>
+              <a:t>‹Nº›</a:t>
             </a:fld>
             <a:endParaRPr lang="es-AR"/>
           </a:p>
@@ -6325,7 +6251,7 @@
             <a:fld id="{DEAB1E94-6728-4D22-B98E-AC9E1765F0E2}" type="slidenum">
               <a:rPr lang="es-AR" smtClean="0"/>
               <a:pPr/>
-              <a:t>‹#›</a:t>
+              <a:t>‹Nº›</a:t>
             </a:fld>
             <a:endParaRPr lang="es-AR"/>
           </a:p>
@@ -6364,7 +6290,7 @@
         </p:nvSpPr>
         <p:spPr>
           <a:xfrm>
-            <a:off x="304802" y="329185"/>
+            <a:off x="304800" y="329184"/>
             <a:ext cx="8532055" cy="6196819"/>
           </a:xfrm>
           <a:prstGeom prst="roundRect">
@@ -6448,7 +6374,7 @@
         </p:nvSpPr>
         <p:spPr>
           <a:xfrm>
-            <a:off x="418597" y="434163"/>
+            <a:off x="418596" y="434162"/>
             <a:ext cx="8306809" cy="4341329"/>
           </a:xfrm>
           <a:prstGeom prst="roundRect">
@@ -6708,7 +6634,7 @@
             <a:fld id="{DEAB1E94-6728-4D22-B98E-AC9E1765F0E2}" type="slidenum">
               <a:rPr lang="es-AR" smtClean="0"/>
               <a:pPr/>
-              <a:t>‹#›</a:t>
+              <a:t>‹Nº›</a:t>
             </a:fld>
             <a:endParaRPr lang="es-AR"/>
           </a:p>
@@ -6979,7 +6905,7 @@
             <a:fld id="{DEAB1E94-6728-4D22-B98E-AC9E1765F0E2}" type="slidenum">
               <a:rPr lang="es-AR" smtClean="0"/>
               <a:pPr/>
-              <a:t>‹#›</a:t>
+              <a:t>‹Nº›</a:t>
             </a:fld>
             <a:endParaRPr lang="es-AR"/>
           </a:p>
@@ -7366,7 +7292,7 @@
             <a:fld id="{DEAB1E94-6728-4D22-B98E-AC9E1765F0E2}" type="slidenum">
               <a:rPr lang="es-AR" smtClean="0"/>
               <a:pPr/>
-              <a:t>‹#›</a:t>
+              <a:t>‹Nº›</a:t>
             </a:fld>
             <a:endParaRPr lang="es-AR"/>
           </a:p>
@@ -7489,7 +7415,7 @@
             <a:fld id="{DEAB1E94-6728-4D22-B98E-AC9E1765F0E2}" type="slidenum">
               <a:rPr lang="es-AR" smtClean="0"/>
               <a:pPr/>
-              <a:t>‹#›</a:t>
+              <a:t>‹Nº›</a:t>
             </a:fld>
             <a:endParaRPr lang="es-AR"/>
           </a:p>
@@ -7528,7 +7454,7 @@
         </p:nvSpPr>
         <p:spPr>
           <a:xfrm>
-            <a:off x="304802" y="329185"/>
+            <a:off x="304800" y="329184"/>
             <a:ext cx="8532055" cy="6196819"/>
           </a:xfrm>
           <a:prstGeom prst="roundRect">
@@ -7671,7 +7597,7 @@
             <a:fld id="{DEAB1E94-6728-4D22-B98E-AC9E1765F0E2}" type="slidenum">
               <a:rPr lang="es-AR" smtClean="0"/>
               <a:pPr/>
-              <a:t>‹#›</a:t>
+              <a:t>‹Nº›</a:t>
             </a:fld>
             <a:endParaRPr lang="es-AR"/>
           </a:p>
@@ -7752,7 +7678,7 @@
         </p:nvSpPr>
         <p:spPr>
           <a:xfrm>
-            <a:off x="5538847" y="1447803"/>
+            <a:off x="5538847" y="1447802"/>
             <a:ext cx="2971800" cy="4206112"/>
           </a:xfrm>
         </p:spPr>
@@ -7854,7 +7780,7 @@
         </p:nvSpPr>
         <p:spPr>
           <a:xfrm>
-            <a:off x="761374" y="930145"/>
+            <a:off x="761372" y="930144"/>
             <a:ext cx="4626159" cy="4724402"/>
           </a:xfrm>
         </p:spPr>
@@ -8007,7 +7933,7 @@
             <a:fld id="{DEAB1E94-6728-4D22-B98E-AC9E1765F0E2}" type="slidenum">
               <a:rPr lang="es-AR" smtClean="0"/>
               <a:pPr/>
-              <a:t>‹#›</a:t>
+              <a:t>‹Nº›</a:t>
             </a:fld>
             <a:endParaRPr lang="es-AR"/>
           </a:p>
@@ -8046,7 +7972,7 @@
         </p:nvSpPr>
         <p:spPr>
           <a:xfrm>
-            <a:off x="304802" y="329185"/>
+            <a:off x="304800" y="329184"/>
             <a:ext cx="8532055" cy="6196819"/>
           </a:xfrm>
           <a:prstGeom prst="roundRect">
@@ -8225,7 +8151,7 @@
         </p:nvSpPr>
         <p:spPr bwMode="grayWhite">
           <a:xfrm>
-            <a:off x="6462712" y="533401"/>
+            <a:off x="6462712" y="533400"/>
             <a:ext cx="2240280" cy="4211480"/>
           </a:xfrm>
         </p:spPr>
@@ -8378,7 +8304,7 @@
             <a:fld id="{DEAB1E94-6728-4D22-B98E-AC9E1765F0E2}" type="slidenum">
               <a:rPr lang="es-AR" smtClean="0"/>
               <a:pPr/>
-              <a:t>‹#›</a:t>
+              <a:t>‹Nº›</a:t>
             </a:fld>
             <a:endParaRPr lang="es-AR"/>
           </a:p>
@@ -8467,7 +8393,7 @@
         </p:nvSpPr>
         <p:spPr>
           <a:xfrm>
-            <a:off x="304802" y="329185"/>
+            <a:off x="304800" y="329184"/>
             <a:ext cx="8532055" cy="6196819"/>
           </a:xfrm>
           <a:prstGeom prst="roundRect">
@@ -8551,7 +8477,7 @@
         </p:nvSpPr>
         <p:spPr>
           <a:xfrm>
-            <a:off x="418597" y="434162"/>
+            <a:off x="418596" y="434162"/>
             <a:ext cx="8306809" cy="5486400"/>
           </a:xfrm>
           <a:prstGeom prst="roundRect">
@@ -8726,7 +8652,7 @@
         </p:nvSpPr>
         <p:spPr>
           <a:xfrm>
-            <a:off x="3776328" y="6111876"/>
+            <a:off x="3776328" y="6111875"/>
             <a:ext cx="2286000" cy="365125"/>
           </a:xfrm>
           <a:prstGeom prst="rect">
@@ -8769,7 +8695,7 @@
         </p:nvSpPr>
         <p:spPr>
           <a:xfrm>
-            <a:off x="6062328" y="6111876"/>
+            <a:off x="6062328" y="6111875"/>
             <a:ext cx="2286000" cy="365125"/>
           </a:xfrm>
           <a:prstGeom prst="rect">
@@ -8807,7 +8733,7 @@
         </p:nvSpPr>
         <p:spPr>
           <a:xfrm>
-            <a:off x="8348328" y="6111876"/>
+            <a:off x="8348328" y="6111875"/>
             <a:ext cx="457200" cy="365125"/>
           </a:xfrm>
           <a:prstGeom prst="rect">
@@ -8832,7 +8758,7 @@
             <a:fld id="{DEAB1E94-6728-4D22-B98E-AC9E1765F0E2}" type="slidenum">
               <a:rPr lang="es-AR" smtClean="0"/>
               <a:pPr/>
-              <a:t>‹#›</a:t>
+              <a:t>‹Nº›</a:t>
             </a:fld>
             <a:endParaRPr lang="es-AR"/>
           </a:p>
@@ -8842,17 +8768,17 @@
   </p:cSld>
   <p:clrMap bg1="lt1" tx1="dk1" bg2="lt2" tx2="dk2" accent1="accent1" accent2="accent2" accent3="accent3" accent4="accent4" accent5="accent5" accent6="accent6" hlink="hlink" folHlink="folHlink"/>
   <p:sldLayoutIdLst>
-    <p:sldLayoutId id="2147483673" r:id="rId1"/>
-    <p:sldLayoutId id="2147483674" r:id="rId2"/>
-    <p:sldLayoutId id="2147483675" r:id="rId3"/>
-    <p:sldLayoutId id="2147483676" r:id="rId4"/>
-    <p:sldLayoutId id="2147483677" r:id="rId5"/>
-    <p:sldLayoutId id="2147483678" r:id="rId6"/>
-    <p:sldLayoutId id="2147483679" r:id="rId7"/>
-    <p:sldLayoutId id="2147483680" r:id="rId8"/>
-    <p:sldLayoutId id="2147483681" r:id="rId9"/>
-    <p:sldLayoutId id="2147483682" r:id="rId10"/>
-    <p:sldLayoutId id="2147483683" r:id="rId11"/>
+    <p:sldLayoutId id="2147483733" r:id="rId1"/>
+    <p:sldLayoutId id="2147483734" r:id="rId2"/>
+    <p:sldLayoutId id="2147483735" r:id="rId3"/>
+    <p:sldLayoutId id="2147483736" r:id="rId4"/>
+    <p:sldLayoutId id="2147483737" r:id="rId5"/>
+    <p:sldLayoutId id="2147483738" r:id="rId6"/>
+    <p:sldLayoutId id="2147483739" r:id="rId7"/>
+    <p:sldLayoutId id="2147483740" r:id="rId8"/>
+    <p:sldLayoutId id="2147483741" r:id="rId9"/>
+    <p:sldLayoutId id="2147483742" r:id="rId10"/>
+    <p:sldLayoutId id="2147483743" r:id="rId11"/>
   </p:sldLayoutIdLst>
   <p:txStyles>
     <p:titleStyle>
@@ -10306,7 +10232,7 @@
           </p:nvPr>
         </p:nvPicPr>
         <p:blipFill>
-          <a:blip r:embed="rId3" cstate="print">
+          <a:blip r:embed="rId4" cstate="print">
             <a:clrChange>
               <a:clrFrom>
                 <a:srgbClr val="FFFFFF"/>
@@ -10318,15 +10244,14 @@
               </a:clrTo>
             </a:clrChange>
           </a:blip>
-          <a:srcRect/>
           <a:stretch>
             <a:fillRect/>
           </a:stretch>
         </p:blipFill>
         <p:spPr bwMode="auto">
           <a:xfrm>
-            <a:off x="1249317" y="580985"/>
-            <a:ext cx="6807450" cy="4746691"/>
+            <a:off x="1623815" y="530225"/>
+            <a:ext cx="5942408" cy="4187825"/>
           </a:xfrm>
           <a:prstGeom prst="rect">
             <a:avLst/>
@@ -10349,7 +10274,7 @@
           <p:nvPr/>
         </p:nvPicPr>
         <p:blipFill>
-          <a:blip r:embed="rId4" cstate="print">
+          <a:blip r:embed="rId5" cstate="print">
             <a:clrChange>
               <a:clrFrom>
                 <a:srgbClr val="FFFFFF"/>
@@ -10392,7 +10317,7 @@
           <p:nvPr/>
         </p:nvPicPr>
         <p:blipFill>
-          <a:blip r:embed="rId5" cstate="print">
+          <a:blip r:embed="rId6" cstate="print">
             <a:clrChange>
               <a:clrFrom>
                 <a:srgbClr val="FFFFFF"/>
@@ -10435,7 +10360,7 @@
           <p:nvPr/>
         </p:nvPicPr>
         <p:blipFill>
-          <a:blip r:embed="rId6" cstate="print">
+          <a:blip r:embed="rId7" cstate="print">
             <a:clrChange>
               <a:clrFrom>
                 <a:srgbClr val="FFFFFF"/>
@@ -10478,7 +10403,7 @@
           <p:nvPr/>
         </p:nvPicPr>
         <p:blipFill>
-          <a:blip r:embed="rId7" cstate="print">
+          <a:blip r:embed="rId8" cstate="print">
             <a:clrChange>
               <a:clrFrom>
                 <a:srgbClr val="FFFFFF"/>
@@ -10513,6 +10438,9 @@
         </p:spPr>
       </p:pic>
     </p:spTree>
+    <p:custDataLst>
+      <p:tags r:id="rId1"/>
+    </p:custDataLst>
   </p:cSld>
   <p:clrMapOvr>
     <a:masterClrMapping/>
@@ -11214,13 +11142,17 @@
           <a:p>
             <a:r>
               <a:rPr lang="es-AR" dirty="0" smtClean="0"/>
-              <a:t>Unidad indivisible a ser enviada</a:t>
+              <a:t>División del pedido</a:t>
             </a:r>
           </a:p>
           <a:p>
             <a:r>
               <a:rPr lang="es-AR" dirty="0" smtClean="0"/>
-              <a:t>División del pedido</a:t>
+              <a:t>Unidad </a:t>
+            </a:r>
+            <a:r>
+              <a:rPr lang="es-AR" dirty="0" smtClean="0"/>
+              <a:t>indivisible a ser enviada</a:t>
             </a:r>
           </a:p>
           <a:p>
@@ -11228,6 +11160,7 @@
               <a:rPr lang="es-AR" dirty="0" smtClean="0"/>
               <a:t>Tipificación</a:t>
             </a:r>
+            <a:endParaRPr lang="es-AR" dirty="0" smtClean="0"/>
           </a:p>
           <a:p>
             <a:r>
@@ -11239,8 +11172,13 @@
             <a:pPr lvl="0"/>
             <a:r>
               <a:rPr lang="es-AR" dirty="0" smtClean="0"/>
-              <a:t>Consulta de ubicación</a:t>
-            </a:r>
+              <a:t>Consulta de </a:t>
+            </a:r>
+            <a:r>
+              <a:rPr lang="es-AR" dirty="0" smtClean="0"/>
+              <a:t>pedido</a:t>
+            </a:r>
+            <a:endParaRPr lang="es-AR" dirty="0" smtClean="0"/>
           </a:p>
           <a:p>
             <a:pPr lvl="0"/>
@@ -11268,7 +11206,7 @@
         </p:nvSpPr>
         <p:spPr>
           <a:xfrm>
-            <a:off x="6097598" y="2920996"/>
+            <a:off x="6096146" y="2950129"/>
             <a:ext cx="1104790" cy="369332"/>
           </a:xfrm>
           <a:prstGeom prst="rect">
@@ -11290,7 +11228,114 @@
           </a:p>
         </p:txBody>
       </p:sp>
+      <p:pic>
+        <p:nvPicPr>
+          <p:cNvPr id="22530" name="Picture 2" descr="http://www.lafepack.com/data/manipulado/limitedeapilamiento.gif"/>
+          <p:cNvPicPr>
+            <a:picLocks noChangeAspect="1" noChangeArrowheads="1"/>
+          </p:cNvPicPr>
+          <p:nvPr/>
+        </p:nvPicPr>
+        <p:blipFill>
+          <a:blip r:embed="rId4"/>
+          <a:srcRect/>
+          <a:stretch>
+            <a:fillRect/>
+          </a:stretch>
+        </p:blipFill>
+        <p:spPr bwMode="auto">
+          <a:xfrm>
+            <a:off x="5338773" y="2552688"/>
+            <a:ext cx="803286" cy="803286"/>
+          </a:xfrm>
+          <a:prstGeom prst="rect">
+            <a:avLst/>
+          </a:prstGeom>
+          <a:noFill/>
+        </p:spPr>
+      </p:pic>
+      <p:pic>
+        <p:nvPicPr>
+          <p:cNvPr id="22532" name="Picture 4" descr="http://www.lafepack.com/data/manipulado/fragil.gif"/>
+          <p:cNvPicPr>
+            <a:picLocks noChangeAspect="1" noChangeArrowheads="1"/>
+          </p:cNvPicPr>
+          <p:nvPr/>
+        </p:nvPicPr>
+        <p:blipFill>
+          <a:blip r:embed="rId5"/>
+          <a:srcRect/>
+          <a:stretch>
+            <a:fillRect/>
+          </a:stretch>
+        </p:blipFill>
+        <p:spPr bwMode="auto">
+          <a:xfrm>
+            <a:off x="7054884" y="2516175"/>
+            <a:ext cx="839799" cy="839799"/>
+          </a:xfrm>
+          <a:prstGeom prst="rect">
+            <a:avLst/>
+          </a:prstGeom>
+          <a:noFill/>
+        </p:spPr>
+      </p:pic>
+      <p:pic>
+        <p:nvPicPr>
+          <p:cNvPr id="22534" name="Picture 6" descr="http://www.lafepack.com/data/manipulado/limitesdetemperatura.gif"/>
+          <p:cNvPicPr>
+            <a:picLocks noChangeAspect="1" noChangeArrowheads="1"/>
+          </p:cNvPicPr>
+          <p:nvPr/>
+        </p:nvPicPr>
+        <p:blipFill>
+          <a:blip r:embed="rId6"/>
+          <a:srcRect/>
+          <a:stretch>
+            <a:fillRect/>
+          </a:stretch>
+        </p:blipFill>
+        <p:spPr bwMode="auto">
+          <a:xfrm>
+            <a:off x="5411799" y="4816494"/>
+            <a:ext cx="766773" cy="766773"/>
+          </a:xfrm>
+          <a:prstGeom prst="rect">
+            <a:avLst/>
+          </a:prstGeom>
+          <a:noFill/>
+        </p:spPr>
+      </p:pic>
+      <p:pic>
+        <p:nvPicPr>
+          <p:cNvPr id="22538" name="Picture 10" descr="http://www.lafepack.com/data/manipulado/protegerhumedad.gif"/>
+          <p:cNvPicPr>
+            <a:picLocks noChangeAspect="1" noChangeArrowheads="1"/>
+          </p:cNvPicPr>
+          <p:nvPr/>
+        </p:nvPicPr>
+        <p:blipFill>
+          <a:blip r:embed="rId7"/>
+          <a:srcRect/>
+          <a:stretch>
+            <a:fillRect/>
+          </a:stretch>
+        </p:blipFill>
+        <p:spPr bwMode="auto">
+          <a:xfrm>
+            <a:off x="7054884" y="4853007"/>
+            <a:ext cx="766773" cy="730260"/>
+          </a:xfrm>
+          <a:prstGeom prst="rect">
+            <a:avLst/>
+          </a:prstGeom>
+          <a:noFill/>
+        </p:spPr>
+      </p:pic>
     </p:spTree>
+    <p:custDataLst>
+      <p:tags r:id="rId1"/>
+    </p:custDataLst>
   </p:cSld>
   <p:clrMapOvr>
     <a:masterClrMapping/>
@@ -11317,207 +11362,14 @@
                             </p:stCondLst>
                             <p:childTnLst>
                               <p:par>
-                                <p:cTn id="5" presetID="9" presetClass="entr" presetSubtype="0" fill="hold" grpId="0" nodeType="clickEffect">
-                                  <p:stCondLst>
-                                    <p:cond delay="0"/>
-                                  </p:stCondLst>
-                                  <p:childTnLst>
-                                    <p:set>
-                                      <p:cBhvr>
-                                        <p:cTn id="6" dur="1" fill="hold">
-                                          <p:stCondLst>
-                                            <p:cond delay="0"/>
-                                          </p:stCondLst>
-                                        </p:cTn>
-                                        <p:tgtEl>
-                                          <p:spTgt spid="39"/>
-                                        </p:tgtEl>
-                                        <p:attrNameLst>
-                                          <p:attrName>style.visibility</p:attrName>
-                                        </p:attrNameLst>
-                                      </p:cBhvr>
-                                      <p:to>
-                                        <p:strVal val="visible"/>
-                                      </p:to>
-                                    </p:set>
-                                    <p:animEffect transition="in" filter="dissolve">
-                                      <p:cBhvr>
-                                        <p:cTn id="7" dur="500"/>
-                                        <p:tgtEl>
-                                          <p:spTgt spid="39"/>
-                                        </p:tgtEl>
-                                      </p:cBhvr>
-                                    </p:animEffect>
-                                  </p:childTnLst>
-                                </p:cTn>
-                              </p:par>
-                              <p:par>
-                                <p:cTn id="8" presetID="9" presetClass="entr" presetSubtype="0" fill="hold" grpId="2" nodeType="withEffect">
-                                  <p:stCondLst>
-                                    <p:cond delay="0"/>
-                                  </p:stCondLst>
-                                  <p:childTnLst>
-                                    <p:set>
-                                      <p:cBhvr>
-                                        <p:cTn id="9" dur="1" fill="hold">
-                                          <p:stCondLst>
-                                            <p:cond delay="0"/>
-                                          </p:stCondLst>
-                                        </p:cTn>
-                                        <p:tgtEl>
-                                          <p:spTgt spid="16"/>
-                                        </p:tgtEl>
-                                        <p:attrNameLst>
-                                          <p:attrName>style.visibility</p:attrName>
-                                        </p:attrNameLst>
-                                      </p:cBhvr>
-                                      <p:to>
-                                        <p:strVal val="visible"/>
-                                      </p:to>
-                                    </p:set>
-                                    <p:animEffect transition="in" filter="dissolve">
-                                      <p:cBhvr>
-                                        <p:cTn id="10" dur="500"/>
-                                        <p:tgtEl>
-                                          <p:spTgt spid="16"/>
-                                        </p:tgtEl>
-                                      </p:cBhvr>
-                                    </p:animEffect>
-                                  </p:childTnLst>
-                                </p:cTn>
-                              </p:par>
-                              <p:par>
-                                <p:cTn id="11" presetID="9" presetClass="entr" presetSubtype="0" fill="hold" grpId="1" nodeType="withEffect">
-                                  <p:stCondLst>
-                                    <p:cond delay="0"/>
-                                  </p:stCondLst>
-                                  <p:childTnLst>
-                                    <p:set>
-                                      <p:cBhvr>
-                                        <p:cTn id="12" dur="1" fill="hold">
-                                          <p:stCondLst>
-                                            <p:cond delay="0"/>
-                                          </p:stCondLst>
-                                        </p:cTn>
-                                        <p:tgtEl>
-                                          <p:spTgt spid="24"/>
-                                        </p:tgtEl>
-                                        <p:attrNameLst>
-                                          <p:attrName>style.visibility</p:attrName>
-                                        </p:attrNameLst>
-                                      </p:cBhvr>
-                                      <p:to>
-                                        <p:strVal val="visible"/>
-                                      </p:to>
-                                    </p:set>
-                                    <p:animEffect transition="in" filter="dissolve">
-                                      <p:cBhvr>
-                                        <p:cTn id="13" dur="500"/>
-                                        <p:tgtEl>
-                                          <p:spTgt spid="24"/>
-                                        </p:tgtEl>
-                                      </p:cBhvr>
-                                    </p:animEffect>
-                                  </p:childTnLst>
-                                </p:cTn>
-                              </p:par>
-                              <p:par>
-                                <p:cTn id="14" presetID="9" presetClass="entr" presetSubtype="0" fill="hold" grpId="1" nodeType="withEffect">
-                                  <p:stCondLst>
-                                    <p:cond delay="0"/>
-                                  </p:stCondLst>
-                                  <p:childTnLst>
-                                    <p:set>
-                                      <p:cBhvr>
-                                        <p:cTn id="15" dur="1" fill="hold">
-                                          <p:stCondLst>
-                                            <p:cond delay="0"/>
-                                          </p:stCondLst>
-                                        </p:cTn>
-                                        <p:tgtEl>
-                                          <p:spTgt spid="26"/>
-                                        </p:tgtEl>
-                                        <p:attrNameLst>
-                                          <p:attrName>style.visibility</p:attrName>
-                                        </p:attrNameLst>
-                                      </p:cBhvr>
-                                      <p:to>
-                                        <p:strVal val="visible"/>
-                                      </p:to>
-                                    </p:set>
-                                    <p:animEffect transition="in" filter="dissolve">
-                                      <p:cBhvr>
-                                        <p:cTn id="16" dur="500"/>
-                                        <p:tgtEl>
-                                          <p:spTgt spid="26"/>
-                                        </p:tgtEl>
-                                      </p:cBhvr>
-                                    </p:animEffect>
-                                  </p:childTnLst>
-                                </p:cTn>
-                              </p:par>
-                              <p:par>
-                                <p:cTn id="17" presetID="9" presetClass="entr" presetSubtype="0" fill="hold" grpId="1" nodeType="withEffect">
-                                  <p:stCondLst>
-                                    <p:cond delay="0"/>
-                                  </p:stCondLst>
-                                  <p:childTnLst>
-                                    <p:set>
-                                      <p:cBhvr>
-                                        <p:cTn id="18" dur="1" fill="hold">
-                                          <p:stCondLst>
-                                            <p:cond delay="0"/>
-                                          </p:stCondLst>
-                                        </p:cTn>
-                                        <p:tgtEl>
-                                          <p:spTgt spid="25"/>
-                                        </p:tgtEl>
-                                        <p:attrNameLst>
-                                          <p:attrName>style.visibility</p:attrName>
-                                        </p:attrNameLst>
-                                      </p:cBhvr>
-                                      <p:to>
-                                        <p:strVal val="visible"/>
-                                      </p:to>
-                                    </p:set>
-                                    <p:animEffect transition="in" filter="dissolve">
-                                      <p:cBhvr>
-                                        <p:cTn id="19" dur="500"/>
-                                        <p:tgtEl>
-                                          <p:spTgt spid="25"/>
-                                        </p:tgtEl>
-                                      </p:cBhvr>
-                                    </p:animEffect>
-                                  </p:childTnLst>
-                                </p:cTn>
-                              </p:par>
-                            </p:childTnLst>
-                          </p:cTn>
-                        </p:par>
-                      </p:childTnLst>
-                    </p:cTn>
-                  </p:par>
-                  <p:par>
-                    <p:cTn id="20" fill="hold">
-                      <p:stCondLst>
-                        <p:cond delay="indefinite"/>
-                      </p:stCondLst>
-                      <p:childTnLst>
-                        <p:par>
-                          <p:cTn id="21" fill="hold">
-                            <p:stCondLst>
-                              <p:cond delay="0"/>
-                            </p:stCondLst>
-                            <p:childTnLst>
-                              <p:par>
-                                <p:cTn id="22" presetID="22" presetClass="exit" presetSubtype="4" fill="hold" grpId="1" nodeType="clickEffect">
+                                <p:cTn id="5" presetID="22" presetClass="exit" presetSubtype="4" fill="hold" grpId="1" nodeType="clickEffect">
                                   <p:stCondLst>
                                     <p:cond delay="0"/>
                                   </p:stCondLst>
                                   <p:childTnLst>
                                     <p:animEffect transition="out" filter="wipe(down)">
                                       <p:cBhvr>
-                                        <p:cTn id="23" dur="500"/>
+                                        <p:cTn id="6" dur="500"/>
                                         <p:tgtEl>
                                           <p:spTgt spid="39"/>
                                         </p:tgtEl>
@@ -11525,7 +11377,7 @@
                                     </p:animEffect>
                                     <p:set>
                                       <p:cBhvr>
-                                        <p:cTn id="24" dur="1" fill="hold">
+                                        <p:cTn id="7" dur="1" fill="hold">
                                           <p:stCondLst>
                                             <p:cond delay="499"/>
                                           </p:stCondLst>
@@ -11545,14 +11397,14 @@
                                 </p:cTn>
                               </p:par>
                               <p:par>
-                                <p:cTn id="25" presetID="56" presetClass="path" presetSubtype="0" accel="50000" decel="50000" fill="hold" grpId="1" nodeType="withEffect">
+                                <p:cTn id="8" presetID="56" presetClass="path" presetSubtype="0" accel="50000" decel="50000" fill="hold" grpId="1" nodeType="withEffect">
                                   <p:stCondLst>
                                     <p:cond delay="0"/>
                                   </p:stCondLst>
                                   <p:childTnLst>
-                                    <p:animMotion origin="layout" path="M 1.38889E-6 2.59944E-6 L 0.08663 -0.11078 " pathEditMode="relative" rAng="0" ptsTypes="AA">
+                                    <p:animMotion origin="layout" path="M -1.94444E-6 3.75289E-6 L 0.0533 -0.12541 " pathEditMode="relative" rAng="0" ptsTypes="AA">
                                       <p:cBhvr>
-                                        <p:cTn id="26" dur="2000" fill="hold"/>
+                                        <p:cTn id="9" dur="2000" fill="hold"/>
                                         <p:tgtEl>
                                           <p:spTgt spid="16"/>
                                         </p:tgtEl>
@@ -11561,20 +11413,20 @@
                                           <p:attrName>ppt_y</p:attrName>
                                         </p:attrNameLst>
                                       </p:cBhvr>
-                                      <p:rCtr x="43" y="-56"/>
+                                      <p:rCtr x="27" y="-63"/>
                                     </p:animMotion>
                                   </p:childTnLst>
                                 </p:cTn>
                               </p:par>
                               <p:par>
-                                <p:cTn id="27" presetID="49" presetClass="path" presetSubtype="0" accel="50000" decel="50000" fill="hold" grpId="0" nodeType="withEffect">
+                                <p:cTn id="10" presetID="49" presetClass="path" presetSubtype="0" accel="50000" decel="50000" fill="hold" grpId="0" nodeType="withEffect">
                                   <p:stCondLst>
                                     <p:cond delay="0"/>
                                   </p:stCondLst>
                                   <p:childTnLst>
-                                    <p:animMotion origin="layout" path="M -1.94444E-6 -3.16374E-6 L -0.08298 -0.11054 " pathEditMode="relative" rAng="0" ptsTypes="AA">
+                                    <p:animMotion origin="layout" path="M 5.55556E-7 3.75289E-6 L -0.05747 -0.12541 " pathEditMode="relative" rAng="0" ptsTypes="AA">
                                       <p:cBhvr>
-                                        <p:cTn id="28" dur="2000" fill="hold"/>
+                                        <p:cTn id="11" dur="2000" fill="hold"/>
                                         <p:tgtEl>
                                           <p:spTgt spid="24"/>
                                         </p:tgtEl>
@@ -11583,20 +11435,20 @@
                                           <p:attrName>ppt_y</p:attrName>
                                         </p:attrNameLst>
                                       </p:cBhvr>
-                                      <p:rCtr x="-41" y="-55"/>
+                                      <p:rCtr x="-29" y="-63"/>
                                     </p:animMotion>
                                   </p:childTnLst>
                                 </p:cTn>
                               </p:par>
                               <p:par>
-                                <p:cTn id="29" presetID="56" presetClass="path" presetSubtype="0" accel="50000" decel="50000" fill="hold" grpId="0" nodeType="withEffect">
+                                <p:cTn id="12" presetID="56" presetClass="path" presetSubtype="0" accel="50000" decel="50000" fill="hold" grpId="0" nodeType="withEffect">
                                   <p:stCondLst>
                                     <p:cond delay="0"/>
                                   </p:stCondLst>
                                   <p:childTnLst>
                                     <p:animMotion origin="layout" path="M -0.05937 0.12095 L -4.44444E-6 3.14524E-6 " pathEditMode="relative" rAng="0" ptsTypes="AA">
                                       <p:cBhvr>
-                                        <p:cTn id="30" dur="2000" spd="-100000" fill="hold"/>
+                                        <p:cTn id="13" dur="2000" spd="-100000" fill="hold"/>
                                         <p:tgtEl>
                                           <p:spTgt spid="26"/>
                                         </p:tgtEl>
@@ -11611,14 +11463,14 @@
                                 </p:cTn>
                               </p:par>
                               <p:par>
-                                <p:cTn id="31" presetID="49" presetClass="path" presetSubtype="0" accel="50000" decel="50000" fill="hold" grpId="0" nodeType="withEffect">
+                                <p:cTn id="14" presetID="49" presetClass="path" presetSubtype="0" accel="50000" decel="50000" fill="hold" grpId="0" nodeType="withEffect">
                                   <p:stCondLst>
                                     <p:cond delay="0"/>
                                   </p:stCondLst>
                                   <p:childTnLst>
-                                    <p:animMotion origin="layout" path="M -0.00364 0.00555 L 0.07136 0.1265 " pathEditMode="relative" rAng="0" ptsTypes="AA">
+                                    <p:animMotion origin="layout" path="M -1.94444E-6 -2.86441E-6 L 0.0533 0.12194 " pathEditMode="relative" rAng="0" ptsTypes="AA">
                                       <p:cBhvr>
-                                        <p:cTn id="32" dur="2000" fill="hold"/>
+                                        <p:cTn id="15" dur="2000" fill="hold"/>
                                         <p:tgtEl>
                                           <p:spTgt spid="25"/>
                                         </p:tgtEl>
@@ -11627,20 +11479,20 @@
                                           <p:attrName>ppt_y</p:attrName>
                                         </p:attrNameLst>
                                       </p:cBhvr>
-                                      <p:rCtr x="38" y="60"/>
+                                      <p:rCtr x="27" y="61"/>
                                     </p:animMotion>
                                   </p:childTnLst>
                                 </p:cTn>
                               </p:par>
                               <p:par>
-                                <p:cTn id="33" presetID="3" presetClass="entr" presetSubtype="10" fill="hold" grpId="0" nodeType="withEffect">
+                                <p:cTn id="16" presetID="3" presetClass="entr" presetSubtype="10" fill="hold" grpId="0" nodeType="withEffect">
                                   <p:stCondLst>
                                     <p:cond delay="0"/>
                                   </p:stCondLst>
                                   <p:childTnLst>
                                     <p:set>
                                       <p:cBhvr>
-                                        <p:cTn id="34" dur="1" fill="hold">
+                                        <p:cTn id="17" dur="1" fill="hold">
                                           <p:stCondLst>
                                             <p:cond delay="0"/>
                                           </p:stCondLst>
@@ -11658,9 +11510,221 @@
                                     </p:set>
                                     <p:animEffect transition="in" filter="blinds(horizontal)">
                                       <p:cBhvr>
-                                        <p:cTn id="35" dur="500"/>
+                                        <p:cTn id="18" dur="500"/>
                                         <p:tgtEl>
                                           <p:spTgt spid="23"/>
+                                        </p:tgtEl>
+                                      </p:cBhvr>
+                                    </p:animEffect>
+                                  </p:childTnLst>
+                                </p:cTn>
+                              </p:par>
+                            </p:childTnLst>
+                          </p:cTn>
+                        </p:par>
+                      </p:childTnLst>
+                    </p:cTn>
+                  </p:par>
+                  <p:par>
+                    <p:cTn id="19" fill="hold">
+                      <p:stCondLst>
+                        <p:cond delay="indefinite"/>
+                      </p:stCondLst>
+                      <p:childTnLst>
+                        <p:par>
+                          <p:cTn id="20" fill="hold">
+                            <p:stCondLst>
+                              <p:cond delay="0"/>
+                            </p:stCondLst>
+                            <p:childTnLst>
+                              <p:par>
+                                <p:cTn id="21" presetID="9" presetClass="entr" presetSubtype="0" fill="hold" nodeType="clickEffect">
+                                  <p:stCondLst>
+                                    <p:cond delay="0"/>
+                                  </p:stCondLst>
+                                  <p:childTnLst>
+                                    <p:set>
+                                      <p:cBhvr>
+                                        <p:cTn id="22" dur="1" fill="hold">
+                                          <p:stCondLst>
+                                            <p:cond delay="0"/>
+                                          </p:stCondLst>
+                                        </p:cTn>
+                                        <p:tgtEl>
+                                          <p:spTgt spid="22530"/>
+                                        </p:tgtEl>
+                                        <p:attrNameLst>
+                                          <p:attrName>style.visibility</p:attrName>
+                                        </p:attrNameLst>
+                                      </p:cBhvr>
+                                      <p:to>
+                                        <p:strVal val="visible"/>
+                                      </p:to>
+                                    </p:set>
+                                    <p:animEffect transition="in" filter="dissolve">
+                                      <p:cBhvr>
+                                        <p:cTn id="23" dur="500"/>
+                                        <p:tgtEl>
+                                          <p:spTgt spid="22530"/>
+                                        </p:tgtEl>
+                                      </p:cBhvr>
+                                    </p:animEffect>
+                                  </p:childTnLst>
+                                </p:cTn>
+                              </p:par>
+                            </p:childTnLst>
+                          </p:cTn>
+                        </p:par>
+                      </p:childTnLst>
+                    </p:cTn>
+                  </p:par>
+                  <p:par>
+                    <p:cTn id="24" fill="hold">
+                      <p:stCondLst>
+                        <p:cond delay="indefinite"/>
+                      </p:stCondLst>
+                      <p:childTnLst>
+                        <p:par>
+                          <p:cTn id="25" fill="hold">
+                            <p:stCondLst>
+                              <p:cond delay="0"/>
+                            </p:stCondLst>
+                            <p:childTnLst>
+                              <p:par>
+                                <p:cTn id="26" presetID="9" presetClass="entr" presetSubtype="0" fill="hold" nodeType="clickEffect">
+                                  <p:stCondLst>
+                                    <p:cond delay="0"/>
+                                  </p:stCondLst>
+                                  <p:childTnLst>
+                                    <p:set>
+                                      <p:cBhvr>
+                                        <p:cTn id="27" dur="1" fill="hold">
+                                          <p:stCondLst>
+                                            <p:cond delay="0"/>
+                                          </p:stCondLst>
+                                        </p:cTn>
+                                        <p:tgtEl>
+                                          <p:spTgt spid="22532"/>
+                                        </p:tgtEl>
+                                        <p:attrNameLst>
+                                          <p:attrName>style.visibility</p:attrName>
+                                        </p:attrNameLst>
+                                      </p:cBhvr>
+                                      <p:to>
+                                        <p:strVal val="visible"/>
+                                      </p:to>
+                                    </p:set>
+                                    <p:animEffect transition="in" filter="dissolve">
+                                      <p:cBhvr>
+                                        <p:cTn id="28" dur="500"/>
+                                        <p:tgtEl>
+                                          <p:spTgt spid="22532"/>
+                                        </p:tgtEl>
+                                      </p:cBhvr>
+                                    </p:animEffect>
+                                  </p:childTnLst>
+                                </p:cTn>
+                              </p:par>
+                            </p:childTnLst>
+                          </p:cTn>
+                        </p:par>
+                      </p:childTnLst>
+                    </p:cTn>
+                  </p:par>
+                  <p:par>
+                    <p:cTn id="29" fill="hold">
+                      <p:stCondLst>
+                        <p:cond delay="indefinite"/>
+                      </p:stCondLst>
+                      <p:childTnLst>
+                        <p:par>
+                          <p:cTn id="30" fill="hold">
+                            <p:stCondLst>
+                              <p:cond delay="0"/>
+                            </p:stCondLst>
+                            <p:childTnLst>
+                              <p:par>
+                                <p:cTn id="31" presetID="9" presetClass="entr" presetSubtype="0" fill="hold" nodeType="clickEffect">
+                                  <p:stCondLst>
+                                    <p:cond delay="0"/>
+                                  </p:stCondLst>
+                                  <p:childTnLst>
+                                    <p:set>
+                                      <p:cBhvr>
+                                        <p:cTn id="32" dur="1" fill="hold">
+                                          <p:stCondLst>
+                                            <p:cond delay="0"/>
+                                          </p:stCondLst>
+                                        </p:cTn>
+                                        <p:tgtEl>
+                                          <p:spTgt spid="22534"/>
+                                        </p:tgtEl>
+                                        <p:attrNameLst>
+                                          <p:attrName>style.visibility</p:attrName>
+                                        </p:attrNameLst>
+                                      </p:cBhvr>
+                                      <p:to>
+                                        <p:strVal val="visible"/>
+                                      </p:to>
+                                    </p:set>
+                                    <p:animEffect transition="in" filter="dissolve">
+                                      <p:cBhvr>
+                                        <p:cTn id="33" dur="500"/>
+                                        <p:tgtEl>
+                                          <p:spTgt spid="22534"/>
+                                        </p:tgtEl>
+                                      </p:cBhvr>
+                                    </p:animEffect>
+                                  </p:childTnLst>
+                                </p:cTn>
+                              </p:par>
+                            </p:childTnLst>
+                          </p:cTn>
+                        </p:par>
+                      </p:childTnLst>
+                    </p:cTn>
+                  </p:par>
+                  <p:par>
+                    <p:cTn id="34" fill="hold">
+                      <p:stCondLst>
+                        <p:cond delay="indefinite"/>
+                      </p:stCondLst>
+                      <p:childTnLst>
+                        <p:par>
+                          <p:cTn id="35" fill="hold">
+                            <p:stCondLst>
+                              <p:cond delay="0"/>
+                            </p:stCondLst>
+                            <p:childTnLst>
+                              <p:par>
+                                <p:cTn id="36" presetID="9" presetClass="entr" presetSubtype="0" fill="hold" nodeType="clickEffect">
+                                  <p:stCondLst>
+                                    <p:cond delay="0"/>
+                                  </p:stCondLst>
+                                  <p:childTnLst>
+                                    <p:set>
+                                      <p:cBhvr>
+                                        <p:cTn id="37" dur="1" fill="hold">
+                                          <p:stCondLst>
+                                            <p:cond delay="0"/>
+                                          </p:stCondLst>
+                                        </p:cTn>
+                                        <p:tgtEl>
+                                          <p:spTgt spid="22538"/>
+                                        </p:tgtEl>
+                                        <p:attrNameLst>
+                                          <p:attrName>style.visibility</p:attrName>
+                                        </p:attrNameLst>
+                                      </p:cBhvr>
+                                      <p:to>
+                                        <p:strVal val="visible"/>
+                                      </p:to>
+                                    </p:set>
+                                    <p:animEffect transition="in" filter="dissolve">
+                                      <p:cBhvr>
+                                        <p:cTn id="38" dur="500"/>
+                                        <p:tgtEl>
+                                          <p:spTgt spid="22538"/>
                                         </p:tgtEl>
                                       </p:cBhvr>
                                     </p:animEffect>
@@ -11697,14 +11761,9 @@
     <p:bldLst>
       <p:bldP spid="23" grpId="0"/>
       <p:bldP spid="24" grpId="0" animBg="1"/>
-      <p:bldP spid="24" grpId="1" animBg="1"/>
       <p:bldP spid="25" grpId="0" animBg="1"/>
-      <p:bldP spid="25" grpId="1" animBg="1"/>
       <p:bldP spid="26" grpId="0" animBg="1"/>
-      <p:bldP spid="26" grpId="1" animBg="1"/>
       <p:bldP spid="16" grpId="1" animBg="1"/>
-      <p:bldP spid="16" grpId="2" animBg="1"/>
-      <p:bldP spid="39" grpId="0"/>
       <p:bldP spid="39" grpId="1"/>
     </p:bldLst>
   </p:timing>
@@ -12355,7 +12414,7 @@
           <p:nvPr/>
         </p:nvPicPr>
         <p:blipFill>
-          <a:blip r:embed="rId2" cstate="print"/>
+          <a:blip r:embed="rId4" cstate="print"/>
           <a:srcRect/>
           <a:stretch>
             <a:fillRect/>
@@ -12388,7 +12447,7 @@
           <p:nvPr/>
         </p:nvPicPr>
         <p:blipFill>
-          <a:blip r:embed="rId3" cstate="print"/>
+          <a:blip r:embed="rId5" cstate="print"/>
           <a:srcRect/>
           <a:stretch>
             <a:fillRect/>
@@ -12413,10 +12472,14 @@
         </p:spPr>
       </p:pic>
     </p:spTree>
+    <p:custDataLst>
+      <p:tags r:id="rId1"/>
+    </p:custDataLst>
   </p:cSld>
   <p:clrMapOvr>
     <a:masterClrMapping/>
   </p:clrMapOvr>
+  <p:transition/>
   <p:timing>
     <p:tnLst>
       <p:par>
@@ -13488,7 +13551,9 @@
         </p:nvSpPr>
         <p:spPr/>
         <p:txBody>
-          <a:bodyPr/>
+          <a:bodyPr>
+            <a:normAutofit/>
+          </a:bodyPr>
           <a:lstStyle/>
           <a:p>
             <a:r>
@@ -13634,6 +13699,24 @@
     </p:tnLst>
   </p:timing>
 </p:sld>
+</file>
+
+<file path=ppt/tags/tag1.xml><?xml version="1.0" encoding="utf-8"?>
+<p:tagLst xmlns:a="http://schemas.openxmlformats.org/drawingml/2006/main" xmlns:r="http://schemas.openxmlformats.org/officeDocument/2006/relationships" xmlns:p="http://schemas.openxmlformats.org/presentationml/2006/main">
+  <p:tag name="TIMING" val="|0.1|0.4|0.3|0.2|0.2"/>
+</p:tagLst>
+</file>
+
+<file path=ppt/tags/tag2.xml><?xml version="1.0" encoding="utf-8"?>
+<p:tagLst xmlns:a="http://schemas.openxmlformats.org/drawingml/2006/main" xmlns:r="http://schemas.openxmlformats.org/officeDocument/2006/relationships" xmlns:p="http://schemas.openxmlformats.org/presentationml/2006/main">
+  <p:tag name="TIMING" val="|0.1|0.7|0.4|0.6|0.6|0.4"/>
+</p:tagLst>
+</file>
+
+<file path=ppt/tags/tag3.xml><?xml version="1.0" encoding="utf-8"?>
+<p:tagLst xmlns:a="http://schemas.openxmlformats.org/drawingml/2006/main" xmlns:r="http://schemas.openxmlformats.org/officeDocument/2006/relationships" xmlns:p="http://schemas.openxmlformats.org/presentationml/2006/main">
+  <p:tag name="TIMING" val="|6.5|1|0.4"/>
+</p:tagLst>
 </file>
 
 <file path=ppt/theme/theme1.xml><?xml version="1.0" encoding="utf-8"?>

</xml_diff>

<commit_message>
Presentacion: Mejorado el diagrama de actividades. Agregado estados a seguimiento Agregadas conclusiones
</commit_message>
<xml_diff>
--- a/TodoMundo/Presentación/Presentacion.pptx
+++ b/TodoMundo/Presentación/Presentacion.pptx
@@ -4022,7 +4022,7 @@
             <a:fld id="{6B7DCFDD-9765-4942-8186-4D444FB7394B}" type="slidenum">
               <a:rPr lang="en-US" smtClean="0"/>
               <a:pPr/>
-              <a:t>‹Nº›</a:t>
+              <a:t>‹#›</a:t>
             </a:fld>
             <a:endParaRPr lang="en-US"/>
           </a:p>
@@ -5336,6 +5336,131 @@
 </p:notes>
 </file>
 
+<file path=ppt/notesSlides/notesSlide8.xml><?xml version="1.0" encoding="utf-8"?>
+<p:notes xmlns:a="http://schemas.openxmlformats.org/drawingml/2006/main" xmlns:r="http://schemas.openxmlformats.org/officeDocument/2006/relationships" xmlns:p="http://schemas.openxmlformats.org/presentationml/2006/main">
+  <p:cSld>
+    <p:spTree>
+      <p:nvGrpSpPr>
+        <p:cNvPr id="1" name=""/>
+        <p:cNvGrpSpPr/>
+        <p:nvPr/>
+      </p:nvGrpSpPr>
+      <p:grpSpPr>
+        <a:xfrm>
+          <a:off x="0" y="0"/>
+          <a:ext cx="0" cy="0"/>
+          <a:chOff x="0" y="0"/>
+          <a:chExt cx="0" cy="0"/>
+        </a:xfrm>
+      </p:grpSpPr>
+      <p:sp>
+        <p:nvSpPr>
+          <p:cNvPr id="2" name="Slide Image Placeholder 1"/>
+          <p:cNvSpPr>
+            <a:spLocks noGrp="1" noRot="1" noChangeAspect="1"/>
+          </p:cNvSpPr>
+          <p:nvPr>
+            <p:ph type="sldImg"/>
+          </p:nvPr>
+        </p:nvSpPr>
+        <p:spPr/>
+      </p:sp>
+      <p:sp>
+        <p:nvSpPr>
+          <p:cNvPr id="3" name="Notes Placeholder 2"/>
+          <p:cNvSpPr>
+            <a:spLocks noGrp="1"/>
+          </p:cNvSpPr>
+          <p:nvPr>
+            <p:ph type="body" idx="1"/>
+          </p:nvPr>
+        </p:nvSpPr>
+        <p:spPr/>
+        <p:txBody>
+          <a:bodyPr>
+            <a:normAutofit/>
+          </a:bodyPr>
+          <a:lstStyle/>
+          <a:p>
+            <a:r>
+              <a:rPr lang="es-ES" dirty="0" smtClean="0"/>
+              <a:t>Forma de trabajo ( hablar de que nos juntamos y que después cada uno trabajaba en base a lo acordado y que esto nos trajo muchos problemas, que manejábamos por mails y gracias a un repositorio y demás.. y que ahora tuvimos 2 semanas que nos encargamos de asegurarnos que todo cierre, revisamos desde el alcance hasta los estados, todo para que no haya ningún punto )</a:t>
+            </a:r>
+          </a:p>
+          <a:p>
+            <a:r>
+              <a:rPr lang="es-ES" dirty="0" smtClean="0"/>
+              <a:t>Trabajo iterativo( permanentemente tuvimos que volver atrás y modificar cosas y nunca terminábamos de corregir absolutamente todo, siempre saltaba algún detalle, al ser un trabajo grande e interconectado, un detalle en un lado implicaba reestructurar toda otra parte. )</a:t>
+            </a:r>
+          </a:p>
+          <a:p>
+            <a:r>
+              <a:rPr lang="es-ES" dirty="0" smtClean="0"/>
+              <a:t>Aprendizaje ( Obviamente a partir de estas iteraciones que tuvimos aprendimos mucho de como encarar estos tipos de problemas, como vimos por ejemplo en los casos de uso, arrancamos sin idea, creyendo que </a:t>
+            </a:r>
+            <a:r>
+              <a:rPr lang="es-ES" dirty="0" err="1" smtClean="0"/>
+              <a:t>teniamos</a:t>
+            </a:r>
+            <a:r>
+              <a:rPr lang="es-ES" dirty="0" smtClean="0"/>
+              <a:t> solo 4 casos, lo cual terminó siendo completamente mentira.. ahora tenemos </a:t>
+            </a:r>
+            <a:r>
+              <a:rPr lang="es-ES" dirty="0" err="1" smtClean="0"/>
+              <a:t>muchisimos</a:t>
+            </a:r>
+            <a:r>
+              <a:rPr lang="es-ES" dirty="0" smtClean="0"/>
+              <a:t> mas, y </a:t>
+            </a:r>
+            <a:r>
+              <a:rPr lang="es-ES" dirty="0" err="1" smtClean="0"/>
+              <a:t>asi</a:t>
+            </a:r>
+            <a:r>
+              <a:rPr lang="es-ES" dirty="0" smtClean="0"/>
+              <a:t> con todos los puntos)</a:t>
+            </a:r>
+            <a:endParaRPr lang="en-US" dirty="0" smtClean="0"/>
+          </a:p>
+          <a:p>
+            <a:endParaRPr lang="en-US" dirty="0"/>
+          </a:p>
+        </p:txBody>
+      </p:sp>
+      <p:sp>
+        <p:nvSpPr>
+          <p:cNvPr id="4" name="Slide Number Placeholder 3"/>
+          <p:cNvSpPr>
+            <a:spLocks noGrp="1"/>
+          </p:cNvSpPr>
+          <p:nvPr>
+            <p:ph type="sldNum" sz="quarter" idx="10"/>
+          </p:nvPr>
+        </p:nvSpPr>
+        <p:spPr/>
+        <p:txBody>
+          <a:bodyPr/>
+          <a:lstStyle/>
+          <a:p>
+            <a:fld id="{6B7DCFDD-9765-4942-8186-4D444FB7394B}" type="slidenum">
+              <a:rPr lang="en-US" smtClean="0"/>
+              <a:pPr/>
+              <a:t>11</a:t>
+            </a:fld>
+            <a:endParaRPr lang="en-US"/>
+          </a:p>
+        </p:txBody>
+      </p:sp>
+    </p:spTree>
+  </p:cSld>
+  <p:clrMapOvr>
+    <a:masterClrMapping/>
+  </p:clrMapOvr>
+</p:notes>
+</file>
+
 <file path=ppt/slideLayouts/slideLayout1.xml><?xml version="1.0" encoding="utf-8"?>
 <p:sldLayout xmlns:a="http://schemas.openxmlformats.org/drawingml/2006/main" xmlns:r="http://schemas.openxmlformats.org/officeDocument/2006/relationships" xmlns:p="http://schemas.openxmlformats.org/presentationml/2006/main" showMasterSp="0" type="title" preserve="1">
   <p:cSld name="Diapositiva de título">
@@ -5690,7 +5815,7 @@
             <a:fld id="{DEAB1E94-6728-4D22-B98E-AC9E1765F0E2}" type="slidenum">
               <a:rPr lang="es-AR" smtClean="0"/>
               <a:pPr/>
-              <a:t>‹Nº›</a:t>
+              <a:t>‹#›</a:t>
             </a:fld>
             <a:endParaRPr lang="es-AR"/>
           </a:p>
@@ -5877,7 +6002,7 @@
             <a:fld id="{DEAB1E94-6728-4D22-B98E-AC9E1765F0E2}" type="slidenum">
               <a:rPr lang="es-AR" smtClean="0"/>
               <a:pPr/>
-              <a:t>‹Nº›</a:t>
+              <a:t>‹#›</a:t>
             </a:fld>
             <a:endParaRPr lang="es-AR"/>
           </a:p>
@@ -6064,7 +6189,7 @@
             <a:fld id="{DEAB1E94-6728-4D22-B98E-AC9E1765F0E2}" type="slidenum">
               <a:rPr lang="es-AR" smtClean="0"/>
               <a:pPr/>
-              <a:t>‹Nº›</a:t>
+              <a:t>‹#›</a:t>
             </a:fld>
             <a:endParaRPr lang="es-AR"/>
           </a:p>
@@ -6251,7 +6376,7 @@
             <a:fld id="{DEAB1E94-6728-4D22-B98E-AC9E1765F0E2}" type="slidenum">
               <a:rPr lang="es-AR" smtClean="0"/>
               <a:pPr/>
-              <a:t>‹Nº›</a:t>
+              <a:t>‹#›</a:t>
             </a:fld>
             <a:endParaRPr lang="es-AR"/>
           </a:p>
@@ -6634,7 +6759,7 @@
             <a:fld id="{DEAB1E94-6728-4D22-B98E-AC9E1765F0E2}" type="slidenum">
               <a:rPr lang="es-AR" smtClean="0"/>
               <a:pPr/>
-              <a:t>‹Nº›</a:t>
+              <a:t>‹#›</a:t>
             </a:fld>
             <a:endParaRPr lang="es-AR"/>
           </a:p>
@@ -6905,7 +7030,7 @@
             <a:fld id="{DEAB1E94-6728-4D22-B98E-AC9E1765F0E2}" type="slidenum">
               <a:rPr lang="es-AR" smtClean="0"/>
               <a:pPr/>
-              <a:t>‹Nº›</a:t>
+              <a:t>‹#›</a:t>
             </a:fld>
             <a:endParaRPr lang="es-AR"/>
           </a:p>
@@ -7292,7 +7417,7 @@
             <a:fld id="{DEAB1E94-6728-4D22-B98E-AC9E1765F0E2}" type="slidenum">
               <a:rPr lang="es-AR" smtClean="0"/>
               <a:pPr/>
-              <a:t>‹Nº›</a:t>
+              <a:t>‹#›</a:t>
             </a:fld>
             <a:endParaRPr lang="es-AR"/>
           </a:p>
@@ -7415,7 +7540,7 @@
             <a:fld id="{DEAB1E94-6728-4D22-B98E-AC9E1765F0E2}" type="slidenum">
               <a:rPr lang="es-AR" smtClean="0"/>
               <a:pPr/>
-              <a:t>‹Nº›</a:t>
+              <a:t>‹#›</a:t>
             </a:fld>
             <a:endParaRPr lang="es-AR"/>
           </a:p>
@@ -7597,7 +7722,7 @@
             <a:fld id="{DEAB1E94-6728-4D22-B98E-AC9E1765F0E2}" type="slidenum">
               <a:rPr lang="es-AR" smtClean="0"/>
               <a:pPr/>
-              <a:t>‹Nº›</a:t>
+              <a:t>‹#›</a:t>
             </a:fld>
             <a:endParaRPr lang="es-AR"/>
           </a:p>
@@ -7933,7 +8058,7 @@
             <a:fld id="{DEAB1E94-6728-4D22-B98E-AC9E1765F0E2}" type="slidenum">
               <a:rPr lang="es-AR" smtClean="0"/>
               <a:pPr/>
-              <a:t>‹Nº›</a:t>
+              <a:t>‹#›</a:t>
             </a:fld>
             <a:endParaRPr lang="es-AR"/>
           </a:p>
@@ -8304,7 +8429,7 @@
             <a:fld id="{DEAB1E94-6728-4D22-B98E-AC9E1765F0E2}" type="slidenum">
               <a:rPr lang="es-AR" smtClean="0"/>
               <a:pPr/>
-              <a:t>‹Nº›</a:t>
+              <a:t>‹#›</a:t>
             </a:fld>
             <a:endParaRPr lang="es-AR"/>
           </a:p>
@@ -8758,7 +8883,7 @@
             <a:fld id="{DEAB1E94-6728-4D22-B98E-AC9E1765F0E2}" type="slidenum">
               <a:rPr lang="es-AR" smtClean="0"/>
               <a:pPr/>
-              <a:t>‹Nº›</a:t>
+              <a:t>‹#›</a:t>
             </a:fld>
             <a:endParaRPr lang="es-AR"/>
           </a:p>
@@ -9636,54 +9761,467 @@
       </p:grpSpPr>
       <p:sp>
         <p:nvSpPr>
-          <p:cNvPr id="2" name="1 Título"/>
-          <p:cNvSpPr>
-            <a:spLocks noGrp="1"/>
+          <p:cNvPr id="4" name="1 Título"/>
+          <p:cNvSpPr txBox="1">
+            <a:spLocks/>
           </p:cNvSpPr>
-          <p:nvPr>
-            <p:ph type="title"/>
-          </p:nvPr>
+          <p:nvPr/>
         </p:nvSpPr>
         <p:spPr>
           <a:xfrm>
-            <a:off x="482544" y="2516175"/>
+            <a:off x="519057" y="4999059"/>
             <a:ext cx="8183880" cy="1051560"/>
           </a:xfrm>
+          <a:prstGeom prst="rect">
+            <a:avLst/>
+          </a:prstGeom>
         </p:spPr>
         <p:txBody>
-          <a:bodyPr/>
+          <a:bodyPr vert="horz" anchor="b">
+            <a:normAutofit/>
+          </a:bodyPr>
           <a:lstStyle/>
           <a:p>
-            <a:pPr algn="ctr"/>
-            <a:r>
-              <a:rPr lang="es-AR" dirty="0" smtClean="0"/>
+            <a:pPr marL="0" marR="0" lvl="0" indent="0" algn="l" defTabSz="914400" rtl="0" eaLnBrk="1" fontAlgn="auto" latinLnBrk="0" hangingPunct="1">
+              <a:lnSpc>
+                <a:spcPct val="100000"/>
+              </a:lnSpc>
+              <a:spcBef>
+                <a:spcPct val="0"/>
+              </a:spcBef>
+              <a:spcAft>
+                <a:spcPts val="0"/>
+              </a:spcAft>
+              <a:buClrTx/>
+              <a:buSzTx/>
+              <a:buFontTx/>
+              <a:buNone/>
+              <a:tabLst/>
+              <a:defRPr/>
+            </a:pPr>
+            <a:r>
+              <a:rPr kumimoji="0" lang="es-AR" sz="3600" b="1" i="0" u="none" strike="noStrike" kern="1200" cap="none" spc="0" normalizeH="0" baseline="0" noProof="0" smtClean="0">
+                <a:ln>
+                  <a:noFill/>
+                </a:ln>
+                <a:solidFill>
+                  <a:schemeClr val="accent1">
+                    <a:tint val="88000"/>
+                    <a:satMod val="150000"/>
+                  </a:schemeClr>
+                </a:solidFill>
+                <a:effectLst>
+                  <a:outerShdw blurRad="53975" dist="22860" dir="5400000" algn="tl" rotWithShape="0">
+                    <a:srgbClr val="000000">
+                      <a:alpha val="55000"/>
+                    </a:srgbClr>
+                  </a:outerShdw>
+                </a:effectLst>
+                <a:uLnTx/>
+                <a:uFillTx/>
+                <a:latin typeface="+mj-lt"/>
+                <a:ea typeface="+mj-ea"/>
+                <a:cs typeface="+mj-cs"/>
+              </a:rPr>
               <a:t>Conclusiones</a:t>
             </a:r>
-            <a:endParaRPr lang="es-AR" dirty="0"/>
+            <a:endParaRPr kumimoji="0" lang="es-AR" sz="3600" b="1" i="0" u="none" strike="noStrike" kern="1200" cap="none" spc="0" normalizeH="0" baseline="0" noProof="0" dirty="0">
+              <a:ln>
+                <a:noFill/>
+              </a:ln>
+              <a:solidFill>
+                <a:schemeClr val="accent1">
+                  <a:tint val="88000"/>
+                  <a:satMod val="150000"/>
+                </a:schemeClr>
+              </a:solidFill>
+              <a:effectLst>
+                <a:outerShdw blurRad="53975" dist="22860" dir="5400000" algn="tl" rotWithShape="0">
+                  <a:srgbClr val="000000">
+                    <a:alpha val="55000"/>
+                  </a:srgbClr>
+                </a:outerShdw>
+              </a:effectLst>
+              <a:uLnTx/>
+              <a:uFillTx/>
+              <a:latin typeface="+mj-lt"/>
+              <a:ea typeface="+mj-ea"/>
+              <a:cs typeface="+mj-cs"/>
+            </a:endParaRPr>
           </a:p>
         </p:txBody>
       </p:sp>
       <p:sp>
         <p:nvSpPr>
-          <p:cNvPr id="3" name="2 Marcador de contenido"/>
-          <p:cNvSpPr>
-            <a:spLocks noGrp="1"/>
+          <p:cNvPr id="5" name="2 Marcador de contenido"/>
+          <p:cNvSpPr txBox="1">
+            <a:spLocks/>
           </p:cNvSpPr>
-          <p:nvPr>
-            <p:ph idx="1"/>
-          </p:nvPr>
+          <p:nvPr/>
         </p:nvSpPr>
         <p:spPr>
           <a:xfrm>
-            <a:off x="502920" y="530352"/>
-            <a:ext cx="8183880" cy="5308506"/>
+            <a:off x="482544" y="507960"/>
+            <a:ext cx="8183880" cy="4198995"/>
           </a:xfrm>
+          <a:prstGeom prst="rect">
+            <a:avLst/>
+          </a:prstGeom>
         </p:spPr>
         <p:txBody>
-          <a:bodyPr/>
+          <a:bodyPr vert="horz" lIns="182880" tIns="91440">
+            <a:normAutofit/>
+          </a:bodyPr>
           <a:lstStyle/>
           <a:p>
-            <a:endParaRPr lang="es-AR" dirty="0"/>
+            <a:pPr marL="265176" marR="0" lvl="0" indent="-265176" algn="l" defTabSz="914400" rtl="0" eaLnBrk="1" fontAlgn="auto" latinLnBrk="0" hangingPunct="1">
+              <a:lnSpc>
+                <a:spcPct val="100000"/>
+              </a:lnSpc>
+              <a:spcBef>
+                <a:spcPts val="250"/>
+              </a:spcBef>
+              <a:spcAft>
+                <a:spcPts val="0"/>
+              </a:spcAft>
+              <a:buClr>
+                <a:schemeClr val="accent1"/>
+              </a:buClr>
+              <a:buSzPct val="80000"/>
+              <a:buFont typeface="Wingdings 2"/>
+              <a:buChar char=""/>
+              <a:tabLst/>
+              <a:defRPr/>
+            </a:pPr>
+            <a:r>
+              <a:rPr kumimoji="0" lang="es-ES" sz="2800" b="0" i="0" u="none" strike="noStrike" kern="1200" cap="none" spc="0" normalizeH="0" baseline="0" noProof="0" dirty="0" smtClean="0">
+                <a:ln>
+                  <a:noFill/>
+                </a:ln>
+                <a:solidFill>
+                  <a:schemeClr val="tx1"/>
+                </a:solidFill>
+                <a:effectLst/>
+                <a:uLnTx/>
+                <a:uFillTx/>
+                <a:latin typeface="+mn-lt"/>
+                <a:ea typeface="+mn-ea"/>
+                <a:cs typeface="+mn-cs"/>
+              </a:rPr>
+              <a:t>Forma de trabajo</a:t>
+            </a:r>
+          </a:p>
+          <a:p>
+            <a:pPr marL="548640" marR="0" lvl="1" indent="-201168" algn="l" defTabSz="914400" rtl="0" eaLnBrk="1" fontAlgn="auto" latinLnBrk="0" hangingPunct="1">
+              <a:lnSpc>
+                <a:spcPct val="100000"/>
+              </a:lnSpc>
+              <a:spcBef>
+                <a:spcPts val="250"/>
+              </a:spcBef>
+              <a:spcAft>
+                <a:spcPts val="0"/>
+              </a:spcAft>
+              <a:buClr>
+                <a:schemeClr val="accent1"/>
+              </a:buClr>
+              <a:buSzPct val="100000"/>
+              <a:buFont typeface="Verdana"/>
+              <a:buChar char="◦"/>
+              <a:tabLst/>
+              <a:defRPr/>
+            </a:pPr>
+            <a:r>
+              <a:rPr kumimoji="0" lang="es-ES" sz="2400" b="0" i="0" u="none" strike="noStrike" kern="1200" cap="none" spc="0" normalizeH="0" baseline="0" noProof="0" dirty="0" smtClean="0">
+                <a:ln>
+                  <a:noFill/>
+                </a:ln>
+                <a:solidFill>
+                  <a:schemeClr val="tx1"/>
+                </a:solidFill>
+                <a:effectLst/>
+                <a:uLnTx/>
+                <a:uFillTx/>
+                <a:latin typeface="+mn-lt"/>
+                <a:ea typeface="+mn-ea"/>
+                <a:cs typeface="+mn-cs"/>
+              </a:rPr>
+              <a:t>Reuniones con separación de tareas.</a:t>
+            </a:r>
+          </a:p>
+          <a:p>
+            <a:pPr marL="548640" marR="0" lvl="1" indent="-201168" algn="l" defTabSz="914400" rtl="0" eaLnBrk="1" fontAlgn="auto" latinLnBrk="0" hangingPunct="1">
+              <a:lnSpc>
+                <a:spcPct val="100000"/>
+              </a:lnSpc>
+              <a:spcBef>
+                <a:spcPts val="250"/>
+              </a:spcBef>
+              <a:spcAft>
+                <a:spcPts val="0"/>
+              </a:spcAft>
+              <a:buClr>
+                <a:schemeClr val="accent1"/>
+              </a:buClr>
+              <a:buSzPct val="100000"/>
+              <a:buFont typeface="Verdana"/>
+              <a:buChar char="◦"/>
+              <a:tabLst/>
+              <a:defRPr/>
+            </a:pPr>
+            <a:r>
+              <a:rPr kumimoji="0" lang="es-ES" sz="2400" b="0" i="0" u="none" strike="noStrike" kern="1200" cap="none" spc="0" normalizeH="0" baseline="0" noProof="0" dirty="0" smtClean="0">
+                <a:ln>
+                  <a:noFill/>
+                </a:ln>
+                <a:solidFill>
+                  <a:schemeClr val="tx1"/>
+                </a:solidFill>
+                <a:effectLst/>
+                <a:uLnTx/>
+                <a:uFillTx/>
+                <a:latin typeface="+mn-lt"/>
+                <a:ea typeface="+mn-ea"/>
+                <a:cs typeface="+mn-cs"/>
+              </a:rPr>
+              <a:t>Repositorio y grupo de mail</a:t>
+            </a:r>
+          </a:p>
+          <a:p>
+            <a:pPr marL="548640" marR="0" lvl="1" indent="-201168" algn="l" defTabSz="914400" rtl="0" eaLnBrk="1" fontAlgn="auto" latinLnBrk="0" hangingPunct="1">
+              <a:lnSpc>
+                <a:spcPct val="100000"/>
+              </a:lnSpc>
+              <a:spcBef>
+                <a:spcPts val="250"/>
+              </a:spcBef>
+              <a:spcAft>
+                <a:spcPts val="0"/>
+              </a:spcAft>
+              <a:buClr>
+                <a:schemeClr val="accent1"/>
+              </a:buClr>
+              <a:buSzPct val="100000"/>
+              <a:buFont typeface="Verdana"/>
+              <a:buChar char="◦"/>
+              <a:tabLst/>
+              <a:defRPr/>
+            </a:pPr>
+            <a:r>
+              <a:rPr kumimoji="0" lang="es-ES" sz="2400" b="0" i="0" u="none" strike="noStrike" kern="1200" cap="none" spc="0" normalizeH="0" baseline="0" noProof="0" dirty="0" smtClean="0">
+                <a:ln>
+                  <a:noFill/>
+                </a:ln>
+                <a:solidFill>
+                  <a:schemeClr val="tx1"/>
+                </a:solidFill>
+                <a:effectLst/>
+                <a:uLnTx/>
+                <a:uFillTx/>
+                <a:latin typeface="+mn-lt"/>
+                <a:ea typeface="+mn-ea"/>
+                <a:cs typeface="+mn-cs"/>
+              </a:rPr>
+              <a:t>Revisión final</a:t>
+            </a:r>
+          </a:p>
+          <a:p>
+            <a:pPr marL="265176" marR="0" lvl="0" indent="-265176" algn="l" defTabSz="914400" rtl="0" eaLnBrk="1" fontAlgn="auto" latinLnBrk="0" hangingPunct="1">
+              <a:lnSpc>
+                <a:spcPct val="100000"/>
+              </a:lnSpc>
+              <a:spcBef>
+                <a:spcPts val="250"/>
+              </a:spcBef>
+              <a:spcAft>
+                <a:spcPts val="0"/>
+              </a:spcAft>
+              <a:buClr>
+                <a:schemeClr val="accent1"/>
+              </a:buClr>
+              <a:buSzPct val="80000"/>
+              <a:buFont typeface="Wingdings 2"/>
+              <a:buChar char=""/>
+              <a:tabLst/>
+              <a:defRPr/>
+            </a:pPr>
+            <a:endParaRPr kumimoji="0" lang="es-ES" sz="2800" b="0" i="0" u="none" strike="noStrike" kern="1200" cap="none" spc="0" normalizeH="0" baseline="0" noProof="0" dirty="0" smtClean="0">
+              <a:ln>
+                <a:noFill/>
+              </a:ln>
+              <a:solidFill>
+                <a:schemeClr val="tx1"/>
+              </a:solidFill>
+              <a:effectLst/>
+              <a:uLnTx/>
+              <a:uFillTx/>
+              <a:latin typeface="+mn-lt"/>
+              <a:ea typeface="+mn-ea"/>
+              <a:cs typeface="+mn-cs"/>
+            </a:endParaRPr>
+          </a:p>
+          <a:p>
+            <a:pPr marL="265176" marR="0" lvl="0" indent="-265176" algn="l" defTabSz="914400" rtl="0" eaLnBrk="1" fontAlgn="auto" latinLnBrk="0" hangingPunct="1">
+              <a:lnSpc>
+                <a:spcPct val="100000"/>
+              </a:lnSpc>
+              <a:spcBef>
+                <a:spcPts val="250"/>
+              </a:spcBef>
+              <a:spcAft>
+                <a:spcPts val="0"/>
+              </a:spcAft>
+              <a:buClr>
+                <a:schemeClr val="accent1"/>
+              </a:buClr>
+              <a:buSzPct val="80000"/>
+              <a:buFont typeface="Wingdings 2"/>
+              <a:buChar char=""/>
+              <a:tabLst/>
+              <a:defRPr/>
+            </a:pPr>
+            <a:r>
+              <a:rPr kumimoji="0" lang="es-ES" sz="2800" b="0" i="0" u="none" strike="noStrike" kern="1200" cap="none" spc="0" normalizeH="0" baseline="0" noProof="0" dirty="0" smtClean="0">
+                <a:ln>
+                  <a:noFill/>
+                </a:ln>
+                <a:solidFill>
+                  <a:schemeClr val="tx1"/>
+                </a:solidFill>
+                <a:effectLst/>
+                <a:uLnTx/>
+                <a:uFillTx/>
+                <a:latin typeface="+mn-lt"/>
+                <a:ea typeface="+mn-ea"/>
+                <a:cs typeface="+mn-cs"/>
+              </a:rPr>
+              <a:t>Trabajo iterativo</a:t>
+            </a:r>
+          </a:p>
+          <a:p>
+            <a:pPr marL="265176" marR="0" lvl="0" indent="-265176" algn="l" defTabSz="914400" rtl="0" eaLnBrk="1" fontAlgn="auto" latinLnBrk="0" hangingPunct="1">
+              <a:lnSpc>
+                <a:spcPct val="100000"/>
+              </a:lnSpc>
+              <a:spcBef>
+                <a:spcPts val="250"/>
+              </a:spcBef>
+              <a:spcAft>
+                <a:spcPts val="0"/>
+              </a:spcAft>
+              <a:buClr>
+                <a:schemeClr val="accent1"/>
+              </a:buClr>
+              <a:buSzPct val="80000"/>
+              <a:buFont typeface="Wingdings 2"/>
+              <a:buChar char=""/>
+              <a:tabLst/>
+              <a:defRPr/>
+            </a:pPr>
+            <a:endParaRPr kumimoji="0" lang="es-ES" sz="2800" b="0" i="0" u="none" strike="noStrike" kern="1200" cap="none" spc="0" normalizeH="0" baseline="0" noProof="0" dirty="0" smtClean="0">
+              <a:ln>
+                <a:noFill/>
+              </a:ln>
+              <a:solidFill>
+                <a:schemeClr val="tx1"/>
+              </a:solidFill>
+              <a:effectLst/>
+              <a:uLnTx/>
+              <a:uFillTx/>
+              <a:latin typeface="+mn-lt"/>
+              <a:ea typeface="+mn-ea"/>
+              <a:cs typeface="+mn-cs"/>
+            </a:endParaRPr>
+          </a:p>
+          <a:p>
+            <a:pPr marL="265176" marR="0" lvl="0" indent="-265176" algn="l" defTabSz="914400" rtl="0" eaLnBrk="1" fontAlgn="auto" latinLnBrk="0" hangingPunct="1">
+              <a:lnSpc>
+                <a:spcPct val="100000"/>
+              </a:lnSpc>
+              <a:spcBef>
+                <a:spcPts val="250"/>
+              </a:spcBef>
+              <a:spcAft>
+                <a:spcPts val="0"/>
+              </a:spcAft>
+              <a:buClr>
+                <a:schemeClr val="accent1"/>
+              </a:buClr>
+              <a:buSzPct val="80000"/>
+              <a:buFont typeface="Wingdings 2"/>
+              <a:buChar char=""/>
+              <a:tabLst/>
+              <a:defRPr/>
+            </a:pPr>
+            <a:r>
+              <a:rPr kumimoji="0" lang="es-ES" sz="2800" b="0" i="0" u="none" strike="noStrike" kern="1200" cap="none" spc="0" normalizeH="0" baseline="0" noProof="0" dirty="0" smtClean="0">
+                <a:ln>
+                  <a:noFill/>
+                </a:ln>
+                <a:solidFill>
+                  <a:schemeClr val="tx1"/>
+                </a:solidFill>
+                <a:effectLst/>
+                <a:uLnTx/>
+                <a:uFillTx/>
+                <a:latin typeface="+mn-lt"/>
+                <a:ea typeface="+mn-ea"/>
+                <a:cs typeface="+mn-cs"/>
+              </a:rPr>
+              <a:t>Aprendizaje</a:t>
+            </a:r>
+          </a:p>
+          <a:p>
+            <a:pPr marL="548640" marR="0" lvl="1" indent="-201168" algn="l" defTabSz="914400" rtl="0" eaLnBrk="1" fontAlgn="auto" latinLnBrk="0" hangingPunct="1">
+              <a:lnSpc>
+                <a:spcPct val="100000"/>
+              </a:lnSpc>
+              <a:spcBef>
+                <a:spcPts val="250"/>
+              </a:spcBef>
+              <a:spcAft>
+                <a:spcPts val="0"/>
+              </a:spcAft>
+              <a:buClr>
+                <a:schemeClr val="accent1"/>
+              </a:buClr>
+              <a:buSzPct val="100000"/>
+              <a:buFont typeface="Verdana"/>
+              <a:buChar char="◦"/>
+              <a:tabLst/>
+              <a:defRPr/>
+            </a:pPr>
+            <a:r>
+              <a:rPr kumimoji="0" lang="es-AR" sz="2400" b="0" i="0" u="none" strike="noStrike" kern="1200" cap="none" spc="0" normalizeH="0" baseline="0" noProof="0" dirty="0" smtClean="0">
+                <a:ln>
+                  <a:noFill/>
+                </a:ln>
+                <a:solidFill>
+                  <a:schemeClr val="tx1"/>
+                </a:solidFill>
+                <a:effectLst/>
+                <a:uLnTx/>
+                <a:uFillTx/>
+                <a:latin typeface="+mn-lt"/>
+                <a:ea typeface="+mn-ea"/>
+                <a:cs typeface="+mn-cs"/>
+              </a:rPr>
+              <a:t> Ejemplo casos de uso</a:t>
+            </a:r>
+            <a:endParaRPr kumimoji="0" lang="es-AR" sz="2400" b="0" i="0" u="none" strike="noStrike" kern="1200" cap="none" spc="0" normalizeH="0" baseline="0" noProof="0" dirty="0">
+              <a:ln>
+                <a:noFill/>
+              </a:ln>
+              <a:solidFill>
+                <a:schemeClr val="tx1"/>
+              </a:solidFill>
+              <a:effectLst/>
+              <a:uLnTx/>
+              <a:uFillTx/>
+              <a:latin typeface="+mn-lt"/>
+              <a:ea typeface="+mn-ea"/>
+              <a:cs typeface="+mn-cs"/>
+            </a:endParaRPr>
           </a:p>
         </p:txBody>
       </p:sp>
@@ -10125,7 +10663,7 @@
       </p:sp>
       <p:pic>
         <p:nvPicPr>
-          <p:cNvPr id="2051" name="Picture 3"/>
+          <p:cNvPr id="4" name="Picture 2"/>
           <p:cNvPicPr>
             <a:picLocks noChangeAspect="1" noChangeArrowheads="1"/>
           </p:cNvPicPr>
@@ -10151,8 +10689,8 @@
         </p:blipFill>
         <p:spPr bwMode="auto">
           <a:xfrm>
-            <a:off x="654102" y="434934"/>
-            <a:ext cx="7715250" cy="5440437"/>
+            <a:off x="1103265" y="434935"/>
+            <a:ext cx="6937470" cy="5476950"/>
           </a:xfrm>
           <a:prstGeom prst="rect">
             <a:avLst/>
@@ -11227,7 +11765,7 @@
           <p:nvPr/>
         </p:nvPicPr>
         <p:blipFill>
-          <a:blip r:embed="rId3"/>
+          <a:blip r:embed="rId3" cstate="print"/>
           <a:srcRect/>
           <a:stretch>
             <a:fillRect/>
@@ -11253,7 +11791,7 @@
           <p:nvPr/>
         </p:nvPicPr>
         <p:blipFill>
-          <a:blip r:embed="rId4"/>
+          <a:blip r:embed="rId4" cstate="print"/>
           <a:srcRect/>
           <a:stretch>
             <a:fillRect/>
@@ -11279,7 +11817,7 @@
           <p:nvPr/>
         </p:nvPicPr>
         <p:blipFill>
-          <a:blip r:embed="rId5"/>
+          <a:blip r:embed="rId5" cstate="print"/>
           <a:srcRect/>
           <a:stretch>
             <a:fillRect/>
@@ -11305,7 +11843,7 @@
           <p:nvPr/>
         </p:nvPicPr>
         <p:blipFill>
-          <a:blip r:embed="rId6"/>
+          <a:blip r:embed="rId6" cstate="print"/>
           <a:srcRect/>
           <a:stretch>
             <a:fillRect/>
@@ -13523,7 +14061,7 @@
           <a:p>
             <a:r>
               <a:rPr lang="es-AR" dirty="0" smtClean="0"/>
-              <a:t>Limitaciones de la consulta	</a:t>
+              <a:t>Limitaciones</a:t>
             </a:r>
           </a:p>
           <a:p>
@@ -13532,20 +14070,12 @@
               <a:rPr lang="es-AR" dirty="0" smtClean="0"/>
               <a:t>Recepción</a:t>
             </a:r>
-            <a:r>
-              <a:rPr lang="es-AR" dirty="0"/>
-              <a:t> </a:t>
-            </a:r>
+          </a:p>
+          <a:p>
+            <a:pPr lvl="1"/>
             <a:r>
               <a:rPr lang="es-AR" dirty="0" smtClean="0"/>
-              <a:t>de la carga</a:t>
-            </a:r>
-          </a:p>
-          <a:p>
-            <a:pPr lvl="1"/>
-            <a:r>
-              <a:rPr lang="es-AR" dirty="0" smtClean="0"/>
-              <a:t>Seguimiento en tiempo real</a:t>
+              <a:t>Tiempo</a:t>
             </a:r>
           </a:p>
         </p:txBody>
@@ -13619,6 +14149,92 @@
           </a:p>
         </p:txBody>
       </p:sp>
+      <p:pic>
+        <p:nvPicPr>
+          <p:cNvPr id="6" name="Picture 3"/>
+          <p:cNvPicPr>
+            <a:picLocks noChangeAspect="1" noChangeArrowheads="1"/>
+          </p:cNvPicPr>
+          <p:nvPr/>
+        </p:nvPicPr>
+        <p:blipFill>
+          <a:blip r:embed="rId3" cstate="print">
+            <a:clrChange>
+              <a:clrFrom>
+                <a:srgbClr val="FFFFFF"/>
+              </a:clrFrom>
+              <a:clrTo>
+                <a:srgbClr val="FFFFFF">
+                  <a:alpha val="0"/>
+                </a:srgbClr>
+              </a:clrTo>
+            </a:clrChange>
+          </a:blip>
+          <a:srcRect/>
+          <a:stretch>
+            <a:fillRect/>
+          </a:stretch>
+        </p:blipFill>
+        <p:spPr bwMode="auto">
+          <a:xfrm>
+            <a:off x="5192721" y="1347759"/>
+            <a:ext cx="2722354" cy="4052943"/>
+          </a:xfrm>
+          <a:prstGeom prst="rect">
+            <a:avLst/>
+          </a:prstGeom>
+          <a:noFill/>
+          <a:ln w="9525">
+            <a:noFill/>
+            <a:miter lim="800000"/>
+            <a:headEnd/>
+            <a:tailEnd/>
+          </a:ln>
+        </p:spPr>
+      </p:pic>
+      <p:pic>
+        <p:nvPicPr>
+          <p:cNvPr id="7" name="Picture 4"/>
+          <p:cNvPicPr>
+            <a:picLocks noChangeAspect="1" noChangeArrowheads="1"/>
+          </p:cNvPicPr>
+          <p:nvPr/>
+        </p:nvPicPr>
+        <p:blipFill>
+          <a:blip r:embed="rId4" cstate="print">
+            <a:clrChange>
+              <a:clrFrom>
+                <a:srgbClr val="FFFFFF"/>
+              </a:clrFrom>
+              <a:clrTo>
+                <a:srgbClr val="FFFFFF">
+                  <a:alpha val="0"/>
+                </a:srgbClr>
+              </a:clrTo>
+            </a:clrChange>
+          </a:blip>
+          <a:srcRect/>
+          <a:stretch>
+            <a:fillRect/>
+          </a:stretch>
+        </p:blipFill>
+        <p:spPr bwMode="auto">
+          <a:xfrm>
+            <a:off x="5703903" y="1238220"/>
+            <a:ext cx="2453562" cy="4197345"/>
+          </a:xfrm>
+          <a:prstGeom prst="rect">
+            <a:avLst/>
+          </a:prstGeom>
+          <a:noFill/>
+          <a:ln w="9525">
+            <a:noFill/>
+            <a:miter lim="800000"/>
+            <a:headEnd/>
+            <a:tailEnd/>
+          </a:ln>
+        </p:spPr>
+      </p:pic>
     </p:spTree>
   </p:cSld>
   <p:clrMapOvr>
@@ -13627,7 +14243,174 @@
   <p:timing>
     <p:tnLst>
       <p:par>
-        <p:cTn id="1" dur="indefinite" restart="never" nodeType="tmRoot"/>
+        <p:cTn id="1" dur="indefinite" restart="never" nodeType="tmRoot">
+          <p:childTnLst>
+            <p:seq concurrent="1" nextAc="seek">
+              <p:cTn id="2" dur="indefinite" nodeType="mainSeq">
+                <p:childTnLst>
+                  <p:par>
+                    <p:cTn id="3" fill="hold">
+                      <p:stCondLst>
+                        <p:cond delay="indefinite"/>
+                        <p:cond evt="onBegin" delay="0">
+                          <p:tn val="2"/>
+                        </p:cond>
+                      </p:stCondLst>
+                      <p:childTnLst>
+                        <p:par>
+                          <p:cTn id="4" fill="hold">
+                            <p:stCondLst>
+                              <p:cond delay="0"/>
+                            </p:stCondLst>
+                            <p:childTnLst>
+                              <p:par>
+                                <p:cTn id="5" presetID="3" presetClass="entr" presetSubtype="10" fill="hold" nodeType="withEffect">
+                                  <p:stCondLst>
+                                    <p:cond delay="0"/>
+                                  </p:stCondLst>
+                                  <p:childTnLst>
+                                    <p:set>
+                                      <p:cBhvr>
+                                        <p:cTn id="6" dur="1" fill="hold">
+                                          <p:stCondLst>
+                                            <p:cond delay="0"/>
+                                          </p:stCondLst>
+                                        </p:cTn>
+                                        <p:tgtEl>
+                                          <p:spTgt spid="6"/>
+                                        </p:tgtEl>
+                                        <p:attrNameLst>
+                                          <p:attrName>style.visibility</p:attrName>
+                                        </p:attrNameLst>
+                                      </p:cBhvr>
+                                      <p:to>
+                                        <p:strVal val="visible"/>
+                                      </p:to>
+                                    </p:set>
+                                    <p:animEffect transition="in" filter="blinds(horizontal)">
+                                      <p:cBhvr>
+                                        <p:cTn id="7" dur="500"/>
+                                        <p:tgtEl>
+                                          <p:spTgt spid="6"/>
+                                        </p:tgtEl>
+                                      </p:cBhvr>
+                                    </p:animEffect>
+                                  </p:childTnLst>
+                                </p:cTn>
+                              </p:par>
+                            </p:childTnLst>
+                          </p:cTn>
+                        </p:par>
+                      </p:childTnLst>
+                    </p:cTn>
+                  </p:par>
+                  <p:par>
+                    <p:cTn id="8" fill="hold">
+                      <p:stCondLst>
+                        <p:cond delay="indefinite"/>
+                      </p:stCondLst>
+                      <p:childTnLst>
+                        <p:par>
+                          <p:cTn id="9" fill="hold">
+                            <p:stCondLst>
+                              <p:cond delay="0"/>
+                            </p:stCondLst>
+                            <p:childTnLst>
+                              <p:par>
+                                <p:cTn id="10" presetID="3" presetClass="exit" presetSubtype="10" fill="hold" nodeType="clickEffect">
+                                  <p:stCondLst>
+                                    <p:cond delay="0"/>
+                                  </p:stCondLst>
+                                  <p:childTnLst>
+                                    <p:animEffect transition="out" filter="blinds(horizontal)">
+                                      <p:cBhvr>
+                                        <p:cTn id="11" dur="500"/>
+                                        <p:tgtEl>
+                                          <p:spTgt spid="6"/>
+                                        </p:tgtEl>
+                                      </p:cBhvr>
+                                    </p:animEffect>
+                                    <p:set>
+                                      <p:cBhvr>
+                                        <p:cTn id="12" dur="1" fill="hold">
+                                          <p:stCondLst>
+                                            <p:cond delay="499"/>
+                                          </p:stCondLst>
+                                        </p:cTn>
+                                        <p:tgtEl>
+                                          <p:spTgt spid="6"/>
+                                        </p:tgtEl>
+                                        <p:attrNameLst>
+                                          <p:attrName>style.visibility</p:attrName>
+                                        </p:attrNameLst>
+                                      </p:cBhvr>
+                                      <p:to>
+                                        <p:strVal val="hidden"/>
+                                      </p:to>
+                                    </p:set>
+                                  </p:childTnLst>
+                                </p:cTn>
+                              </p:par>
+                              <p:par>
+                                <p:cTn id="13" presetID="3" presetClass="entr" presetSubtype="10" fill="hold" nodeType="withEffect">
+                                  <p:stCondLst>
+                                    <p:cond delay="0"/>
+                                  </p:stCondLst>
+                                  <p:childTnLst>
+                                    <p:set>
+                                      <p:cBhvr>
+                                        <p:cTn id="14" dur="1" fill="hold">
+                                          <p:stCondLst>
+                                            <p:cond delay="0"/>
+                                          </p:stCondLst>
+                                        </p:cTn>
+                                        <p:tgtEl>
+                                          <p:spTgt spid="7"/>
+                                        </p:tgtEl>
+                                        <p:attrNameLst>
+                                          <p:attrName>style.visibility</p:attrName>
+                                        </p:attrNameLst>
+                                      </p:cBhvr>
+                                      <p:to>
+                                        <p:strVal val="visible"/>
+                                      </p:to>
+                                    </p:set>
+                                    <p:animEffect transition="in" filter="blinds(horizontal)">
+                                      <p:cBhvr>
+                                        <p:cTn id="15" dur="500"/>
+                                        <p:tgtEl>
+                                          <p:spTgt spid="7"/>
+                                        </p:tgtEl>
+                                      </p:cBhvr>
+                                    </p:animEffect>
+                                  </p:childTnLst>
+                                </p:cTn>
+                              </p:par>
+                            </p:childTnLst>
+                          </p:cTn>
+                        </p:par>
+                      </p:childTnLst>
+                    </p:cTn>
+                  </p:par>
+                </p:childTnLst>
+              </p:cTn>
+              <p:prevCondLst>
+                <p:cond evt="onPrev" delay="0">
+                  <p:tgtEl>
+                    <p:sldTgt/>
+                  </p:tgtEl>
+                </p:cond>
+              </p:prevCondLst>
+              <p:nextCondLst>
+                <p:cond evt="onNext" delay="0">
+                  <p:tgtEl>
+                    <p:sldTgt/>
+                  </p:tgtEl>
+                </p:cond>
+              </p:nextCondLst>
+            </p:seq>
+          </p:childTnLst>
+        </p:cTn>
       </p:par>
     </p:tnLst>
   </p:timing>

</xml_diff>